<commit_message>
add slide and report
</commit_message>
<xml_diff>
--- a/Slide.pptx
+++ b/Slide.pptx
@@ -5,26 +5,24 @@
     <p:sldMasterId id="2147483648" r:id="rId4"/>
   </p:sldMasterIdLst>
   <p:notesMasterIdLst>
-    <p:notesMasterId r:id="rId19"/>
+    <p:notesMasterId r:id="rId17"/>
   </p:notesMasterIdLst>
   <p:handoutMasterIdLst>
-    <p:handoutMasterId r:id="rId20"/>
+    <p:handoutMasterId r:id="rId18"/>
   </p:handoutMasterIdLst>
   <p:sldIdLst>
     <p:sldId id="256" r:id="rId5"/>
-    <p:sldId id="257" r:id="rId6"/>
-    <p:sldId id="260" r:id="rId7"/>
-    <p:sldId id="258" r:id="rId8"/>
-    <p:sldId id="261" r:id="rId9"/>
-    <p:sldId id="288" r:id="rId10"/>
-    <p:sldId id="291" r:id="rId11"/>
-    <p:sldId id="293" r:id="rId12"/>
-    <p:sldId id="294" r:id="rId13"/>
-    <p:sldId id="295" r:id="rId14"/>
-    <p:sldId id="296" r:id="rId15"/>
-    <p:sldId id="292" r:id="rId16"/>
-    <p:sldId id="290" r:id="rId17"/>
-    <p:sldId id="269" r:id="rId18"/>
+    <p:sldId id="260" r:id="rId6"/>
+    <p:sldId id="258" r:id="rId7"/>
+    <p:sldId id="288" r:id="rId8"/>
+    <p:sldId id="291" r:id="rId9"/>
+    <p:sldId id="293" r:id="rId10"/>
+    <p:sldId id="294" r:id="rId11"/>
+    <p:sldId id="295" r:id="rId12"/>
+    <p:sldId id="296" r:id="rId13"/>
+    <p:sldId id="292" r:id="rId14"/>
+    <p:sldId id="290" r:id="rId15"/>
+    <p:sldId id="269" r:id="rId16"/>
   </p:sldIdLst>
   <p:sldSz cx="12192000" cy="6858000"/>
   <p:notesSz cx="6858000" cy="9144000"/>
@@ -30867,7 +30865,7 @@
                   </a:schemeClr>
                 </a:solidFill>
               </a:rPr>
-              <a:t>	Roll: BSSE1209			Associate professor</a:t>
+              <a:t>	Roll: 60931				Associate professor</a:t>
             </a:r>
           </a:p>
         </p:txBody>
@@ -30936,417 +30934,6 @@
       </p:grpSpPr>
       <p:sp>
         <p:nvSpPr>
-          <p:cNvPr id="2" name="Title 1">
-            <a:extLst>
-              <a:ext uri="{FF2B5EF4-FFF2-40B4-BE49-F238E27FC236}">
-                <a16:creationId xmlns:a16="http://schemas.microsoft.com/office/drawing/2014/main" id="{4A2A83BE-8AC8-5D47-11A2-4398A871A917}"/>
-              </a:ext>
-            </a:extLst>
-          </p:cNvPr>
-          <p:cNvSpPr>
-            <a:spLocks noGrp="1"/>
-          </p:cNvSpPr>
-          <p:nvPr>
-            <p:ph type="title"/>
-          </p:nvPr>
-        </p:nvSpPr>
-        <p:spPr/>
-        <p:txBody>
-          <a:bodyPr/>
-          <a:lstStyle/>
-          <a:p>
-            <a:r>
-              <a:rPr lang="en-US" dirty="0"/>
-              <a:t>Linear programming</a:t>
-            </a:r>
-          </a:p>
-        </p:txBody>
-      </p:sp>
-      <p:sp>
-        <p:nvSpPr>
-          <p:cNvPr id="3" name="Slide Number Placeholder 2">
-            <a:extLst>
-              <a:ext uri="{FF2B5EF4-FFF2-40B4-BE49-F238E27FC236}">
-                <a16:creationId xmlns:a16="http://schemas.microsoft.com/office/drawing/2014/main" id="{7AF3300F-ACB9-1363-28F0-2C0A1FAF64F8}"/>
-              </a:ext>
-            </a:extLst>
-          </p:cNvPr>
-          <p:cNvSpPr>
-            <a:spLocks noGrp="1"/>
-          </p:cNvSpPr>
-          <p:nvPr>
-            <p:ph type="sldNum" sz="quarter" idx="12"/>
-          </p:nvPr>
-        </p:nvSpPr>
-        <p:spPr/>
-        <p:txBody>
-          <a:bodyPr/>
-          <a:lstStyle/>
-          <a:p>
-            <a:fld id="{C263D6C4-4840-40CC-AC84-17E24B3B7BDE}" type="slidenum">
-              <a:rPr lang="en-US" noProof="0" smtClean="0"/>
-              <a:pPr/>
-              <a:t>10</a:t>
-            </a:fld>
-            <a:endParaRPr lang="en-US" noProof="0" dirty="0"/>
-          </a:p>
-        </p:txBody>
-      </p:sp>
-      <p:graphicFrame>
-        <p:nvGraphicFramePr>
-          <p:cNvPr id="8" name="Diagram 7">
-            <a:extLst>
-              <a:ext uri="{FF2B5EF4-FFF2-40B4-BE49-F238E27FC236}">
-                <a16:creationId xmlns:a16="http://schemas.microsoft.com/office/drawing/2014/main" id="{3652220F-1141-7D11-9177-97D172CBEDBF}"/>
-              </a:ext>
-            </a:extLst>
-          </p:cNvPr>
-          <p:cNvGraphicFramePr/>
-          <p:nvPr>
-            <p:extLst>
-              <p:ext uri="{D42A27DB-BD31-4B8C-83A1-F6EECF244321}">
-                <p14:modId xmlns:p14="http://schemas.microsoft.com/office/powerpoint/2010/main" val="3631554503"/>
-              </p:ext>
-            </p:extLst>
-          </p:nvPr>
-        </p:nvGraphicFramePr>
-        <p:xfrm>
-          <a:off x="1826315" y="1667894"/>
-          <a:ext cx="8450470" cy="4057742"/>
-        </p:xfrm>
-        <a:graphic>
-          <a:graphicData uri="http://schemas.openxmlformats.org/drawingml/2006/diagram">
-            <dgm:relIds xmlns:dgm="http://schemas.openxmlformats.org/drawingml/2006/diagram" xmlns:r="http://schemas.openxmlformats.org/officeDocument/2006/relationships" r:dm="rId2" r:lo="rId3" r:qs="rId4" r:cs="rId5"/>
-          </a:graphicData>
-        </a:graphic>
-      </p:graphicFrame>
-    </p:spTree>
-    <p:extLst>
-      <p:ext uri="{BB962C8B-B14F-4D97-AF65-F5344CB8AC3E}">
-        <p14:creationId xmlns:p14="http://schemas.microsoft.com/office/powerpoint/2010/main" val="3232853897"/>
-      </p:ext>
-    </p:extLst>
-  </p:cSld>
-  <p:clrMapOvr>
-    <a:masterClrMapping/>
-  </p:clrMapOvr>
-</p:sld>
-</file>
-
-<file path=ppt/slides/slide11.xml><?xml version="1.0" encoding="utf-8"?>
-<p:sld xmlns:a="http://schemas.openxmlformats.org/drawingml/2006/main" xmlns:r="http://schemas.openxmlformats.org/officeDocument/2006/relationships" xmlns:p="http://schemas.openxmlformats.org/presentationml/2006/main">
-  <p:cSld>
-    <p:spTree>
-      <p:nvGrpSpPr>
-        <p:cNvPr id="1" name=""/>
-        <p:cNvGrpSpPr/>
-        <p:nvPr/>
-      </p:nvGrpSpPr>
-      <p:grpSpPr>
-        <a:xfrm>
-          <a:off x="0" y="0"/>
-          <a:ext cx="0" cy="0"/>
-          <a:chOff x="0" y="0"/>
-          <a:chExt cx="0" cy="0"/>
-        </a:xfrm>
-      </p:grpSpPr>
-      <p:sp>
-        <p:nvSpPr>
-          <p:cNvPr id="2" name="Title 1">
-            <a:extLst>
-              <a:ext uri="{FF2B5EF4-FFF2-40B4-BE49-F238E27FC236}">
-                <a16:creationId xmlns:a16="http://schemas.microsoft.com/office/drawing/2014/main" id="{0C4D216D-BB92-D39F-71EC-330C47E9D031}"/>
-              </a:ext>
-            </a:extLst>
-          </p:cNvPr>
-          <p:cNvSpPr>
-            <a:spLocks noGrp="1"/>
-          </p:cNvSpPr>
-          <p:nvPr>
-            <p:ph type="title"/>
-          </p:nvPr>
-        </p:nvSpPr>
-        <p:spPr/>
-        <p:txBody>
-          <a:bodyPr/>
-          <a:lstStyle/>
-          <a:p>
-            <a:r>
-              <a:rPr lang="en-US" dirty="0"/>
-              <a:t>Output</a:t>
-            </a:r>
-          </a:p>
-        </p:txBody>
-      </p:sp>
-      <p:sp>
-        <p:nvSpPr>
-          <p:cNvPr id="3" name="Slide Number Placeholder 2">
-            <a:extLst>
-              <a:ext uri="{FF2B5EF4-FFF2-40B4-BE49-F238E27FC236}">
-                <a16:creationId xmlns:a16="http://schemas.microsoft.com/office/drawing/2014/main" id="{68092661-66BC-1ED4-C7F8-1D00981BCD04}"/>
-              </a:ext>
-            </a:extLst>
-          </p:cNvPr>
-          <p:cNvSpPr>
-            <a:spLocks noGrp="1"/>
-          </p:cNvSpPr>
-          <p:nvPr>
-            <p:ph type="sldNum" sz="quarter" idx="12"/>
-          </p:nvPr>
-        </p:nvSpPr>
-        <p:spPr/>
-        <p:txBody>
-          <a:bodyPr/>
-          <a:lstStyle/>
-          <a:p>
-            <a:fld id="{C263D6C4-4840-40CC-AC84-17E24B3B7BDE}" type="slidenum">
-              <a:rPr lang="en-US" noProof="0" smtClean="0"/>
-              <a:pPr/>
-              <a:t>11</a:t>
-            </a:fld>
-            <a:endParaRPr lang="en-US" noProof="0" dirty="0"/>
-          </a:p>
-        </p:txBody>
-      </p:sp>
-      <p:pic>
-        <p:nvPicPr>
-          <p:cNvPr id="9" name="Picture 8">
-            <a:extLst>
-              <a:ext uri="{FF2B5EF4-FFF2-40B4-BE49-F238E27FC236}">
-                <a16:creationId xmlns:a16="http://schemas.microsoft.com/office/drawing/2014/main" id="{82EB5BEE-58FC-D149-E595-E7413C61699B}"/>
-              </a:ext>
-            </a:extLst>
-          </p:cNvPr>
-          <p:cNvPicPr>
-            <a:picLocks noChangeAspect="1"/>
-          </p:cNvPicPr>
-          <p:nvPr/>
-        </p:nvPicPr>
-        <p:blipFill>
-          <a:blip r:embed="rId2"/>
-          <a:stretch>
-            <a:fillRect/>
-          </a:stretch>
-        </p:blipFill>
-        <p:spPr>
-          <a:xfrm>
-            <a:off x="167802" y="2638263"/>
-            <a:ext cx="4368858" cy="4041937"/>
-          </a:xfrm>
-          <a:prstGeom prst="rect">
-            <a:avLst/>
-          </a:prstGeom>
-        </p:spPr>
-      </p:pic>
-      <p:pic>
-        <p:nvPicPr>
-          <p:cNvPr id="11" name="Picture 10">
-            <a:extLst>
-              <a:ext uri="{FF2B5EF4-FFF2-40B4-BE49-F238E27FC236}">
-                <a16:creationId xmlns:a16="http://schemas.microsoft.com/office/drawing/2014/main" id="{0D04D7DA-622B-79EA-D274-48918E031F8F}"/>
-              </a:ext>
-            </a:extLst>
-          </p:cNvPr>
-          <p:cNvPicPr>
-            <a:picLocks noChangeAspect="1"/>
-          </p:cNvPicPr>
-          <p:nvPr/>
-        </p:nvPicPr>
-        <p:blipFill>
-          <a:blip r:embed="rId3"/>
-          <a:stretch>
-            <a:fillRect/>
-          </a:stretch>
-        </p:blipFill>
-        <p:spPr>
-          <a:xfrm>
-            <a:off x="7655341" y="2485830"/>
-            <a:ext cx="4210022" cy="4194370"/>
-          </a:xfrm>
-          <a:prstGeom prst="rect">
-            <a:avLst/>
-          </a:prstGeom>
-        </p:spPr>
-      </p:pic>
-      <p:sp>
-        <p:nvSpPr>
-          <p:cNvPr id="12" name="Oval 11">
-            <a:extLst>
-              <a:ext uri="{FF2B5EF4-FFF2-40B4-BE49-F238E27FC236}">
-                <a16:creationId xmlns:a16="http://schemas.microsoft.com/office/drawing/2014/main" id="{1B6C53B6-D6FA-11E6-6877-7C393AAF64B4}"/>
-              </a:ext>
-            </a:extLst>
-          </p:cNvPr>
-          <p:cNvSpPr/>
-          <p:nvPr/>
-        </p:nvSpPr>
-        <p:spPr>
-          <a:xfrm>
-            <a:off x="4200939" y="1457739"/>
-            <a:ext cx="3454402" cy="861391"/>
-          </a:xfrm>
-          <a:prstGeom prst="ellipse">
-            <a:avLst/>
-          </a:prstGeom>
-        </p:spPr>
-        <p:style>
-          <a:lnRef idx="2">
-            <a:schemeClr val="accent1">
-              <a:shade val="50000"/>
-            </a:schemeClr>
-          </a:lnRef>
-          <a:fillRef idx="1">
-            <a:schemeClr val="accent1"/>
-          </a:fillRef>
-          <a:effectRef idx="0">
-            <a:schemeClr val="accent1"/>
-          </a:effectRef>
-          <a:fontRef idx="minor">
-            <a:schemeClr val="lt1"/>
-          </a:fontRef>
-        </p:style>
-        <p:txBody>
-          <a:bodyPr rtlCol="0" anchor="ctr"/>
-          <a:lstStyle/>
-          <a:p>
-            <a:pPr algn="ctr"/>
-            <a:r>
-              <a:rPr lang="en-US" dirty="0"/>
-              <a:t>Linear programming</a:t>
-            </a:r>
-          </a:p>
-        </p:txBody>
-      </p:sp>
-      <p:sp>
-        <p:nvSpPr>
-          <p:cNvPr id="13" name="Arrow: Left 12">
-            <a:extLst>
-              <a:ext uri="{FF2B5EF4-FFF2-40B4-BE49-F238E27FC236}">
-                <a16:creationId xmlns:a16="http://schemas.microsoft.com/office/drawing/2014/main" id="{14C0BC87-C3E3-29C8-63CE-76DAFDEA3804}"/>
-              </a:ext>
-            </a:extLst>
-          </p:cNvPr>
-          <p:cNvSpPr/>
-          <p:nvPr/>
-        </p:nvSpPr>
-        <p:spPr>
-          <a:xfrm>
-            <a:off x="4708084" y="3246782"/>
-            <a:ext cx="1895917" cy="841927"/>
-          </a:xfrm>
-          <a:prstGeom prst="leftArrow">
-            <a:avLst/>
-          </a:prstGeom>
-        </p:spPr>
-        <p:style>
-          <a:lnRef idx="2">
-            <a:schemeClr val="accent1">
-              <a:shade val="50000"/>
-            </a:schemeClr>
-          </a:lnRef>
-          <a:fillRef idx="1">
-            <a:schemeClr val="accent1"/>
-          </a:fillRef>
-          <a:effectRef idx="0">
-            <a:schemeClr val="accent1"/>
-          </a:effectRef>
-          <a:fontRef idx="minor">
-            <a:schemeClr val="lt1"/>
-          </a:fontRef>
-        </p:style>
-        <p:txBody>
-          <a:bodyPr rtlCol="0" anchor="ctr"/>
-          <a:lstStyle/>
-          <a:p>
-            <a:pPr algn="ctr"/>
-            <a:r>
-              <a:rPr lang="en-US" dirty="0"/>
-              <a:t>Max value</a:t>
-            </a:r>
-          </a:p>
-        </p:txBody>
-      </p:sp>
-      <p:sp>
-        <p:nvSpPr>
-          <p:cNvPr id="14" name="Arrow: Right 13">
-            <a:extLst>
-              <a:ext uri="{FF2B5EF4-FFF2-40B4-BE49-F238E27FC236}">
-                <a16:creationId xmlns:a16="http://schemas.microsoft.com/office/drawing/2014/main" id="{A6E8553E-63D4-C6A0-AA6F-ED930558F85C}"/>
-              </a:ext>
-            </a:extLst>
-          </p:cNvPr>
-          <p:cNvSpPr/>
-          <p:nvPr/>
-        </p:nvSpPr>
-        <p:spPr>
-          <a:xfrm>
-            <a:off x="5287617" y="5168348"/>
-            <a:ext cx="2067340" cy="861391"/>
-          </a:xfrm>
-          <a:prstGeom prst="rightArrow">
-            <a:avLst/>
-          </a:prstGeom>
-        </p:spPr>
-        <p:style>
-          <a:lnRef idx="2">
-            <a:schemeClr val="accent1">
-              <a:shade val="50000"/>
-            </a:schemeClr>
-          </a:lnRef>
-          <a:fillRef idx="1">
-            <a:schemeClr val="accent1"/>
-          </a:fillRef>
-          <a:effectRef idx="0">
-            <a:schemeClr val="accent1"/>
-          </a:effectRef>
-          <a:fontRef idx="minor">
-            <a:schemeClr val="lt1"/>
-          </a:fontRef>
-        </p:style>
-        <p:txBody>
-          <a:bodyPr rtlCol="0" anchor="ctr"/>
-          <a:lstStyle/>
-          <a:p>
-            <a:pPr algn="ctr"/>
-            <a:r>
-              <a:rPr lang="en-US" dirty="0"/>
-              <a:t>Min value</a:t>
-            </a:r>
-          </a:p>
-        </p:txBody>
-      </p:sp>
-    </p:spTree>
-    <p:extLst>
-      <p:ext uri="{BB962C8B-B14F-4D97-AF65-F5344CB8AC3E}">
-        <p14:creationId xmlns:p14="http://schemas.microsoft.com/office/powerpoint/2010/main" val="46995629"/>
-      </p:ext>
-    </p:extLst>
-  </p:cSld>
-  <p:clrMapOvr>
-    <a:masterClrMapping/>
-  </p:clrMapOvr>
-</p:sld>
-</file>
-
-<file path=ppt/slides/slide12.xml><?xml version="1.0" encoding="utf-8"?>
-<p:sld xmlns:a="http://schemas.openxmlformats.org/drawingml/2006/main" xmlns:r="http://schemas.openxmlformats.org/officeDocument/2006/relationships" xmlns:p="http://schemas.openxmlformats.org/presentationml/2006/main">
-  <p:cSld>
-    <p:spTree>
-      <p:nvGrpSpPr>
-        <p:cNvPr id="1" name=""/>
-        <p:cNvGrpSpPr/>
-        <p:nvPr/>
-      </p:nvGrpSpPr>
-      <p:grpSpPr>
-        <a:xfrm>
-          <a:off x="0" y="0"/>
-          <a:ext cx="0" cy="0"/>
-          <a:chOff x="0" y="0"/>
-          <a:chExt cx="0" cy="0"/>
-        </a:xfrm>
-      </p:grpSpPr>
-      <p:sp>
-        <p:nvSpPr>
           <p:cNvPr id="2" name="Title 1"/>
           <p:cNvSpPr>
             <a:spLocks noGrp="1"/>
@@ -31386,7 +30973,7 @@
             <a:fld id="{C263D6C4-4840-40CC-AC84-17E24B3B7BDE}" type="slidenum">
               <a:rPr lang="en-US" noProof="0" smtClean="0"/>
               <a:pPr/>
-              <a:t>12</a:t>
+              <a:t>10</a:t>
             </a:fld>
             <a:endParaRPr lang="en-US" noProof="0" dirty="0"/>
           </a:p>
@@ -31557,56 +31144,6 @@
             <a:r>
               <a:rPr lang="en-US" dirty="0"/>
               <a:t> algorithm</a:t>
-            </a:r>
-            <a:endParaRPr lang="en-SG" dirty="0"/>
-          </a:p>
-        </p:txBody>
-      </p:sp>
-      <p:sp>
-        <p:nvSpPr>
-          <p:cNvPr id="9" name="Rounded Rectangle 5">
-            <a:extLst>
-              <a:ext uri="{FF2B5EF4-FFF2-40B4-BE49-F238E27FC236}">
-                <a16:creationId xmlns:a16="http://schemas.microsoft.com/office/drawing/2014/main" id="{219ED79F-63C4-F8C1-BAD4-CAEF660A9A3E}"/>
-              </a:ext>
-            </a:extLst>
-          </p:cNvPr>
-          <p:cNvSpPr/>
-          <p:nvPr/>
-        </p:nvSpPr>
-        <p:spPr>
-          <a:xfrm>
-            <a:off x="2367693" y="5256447"/>
-            <a:ext cx="5180508" cy="618136"/>
-          </a:xfrm>
-          <a:prstGeom prst="roundRect">
-            <a:avLst/>
-          </a:prstGeom>
-        </p:spPr>
-        <p:style>
-          <a:lnRef idx="2">
-            <a:schemeClr val="accent1">
-              <a:shade val="50000"/>
-            </a:schemeClr>
-          </a:lnRef>
-          <a:fillRef idx="1">
-            <a:schemeClr val="accent1"/>
-          </a:fillRef>
-          <a:effectRef idx="0">
-            <a:schemeClr val="accent1"/>
-          </a:effectRef>
-          <a:fontRef idx="minor">
-            <a:schemeClr val="lt1"/>
-          </a:fontRef>
-        </p:style>
-        <p:txBody>
-          <a:bodyPr rtlCol="0" anchor="ctr"/>
-          <a:lstStyle/>
-          <a:p>
-            <a:pPr algn="ctr"/>
-            <a:r>
-              <a:rPr lang="en-US" dirty="0"/>
-              <a:t>Handle big data</a:t>
             </a:r>
             <a:endParaRPr lang="en-SG" dirty="0"/>
           </a:p>
@@ -31861,79 +31398,6 @@
                                   </p:childTnLst>
                                 </p:cTn>
                               </p:par>
-                              <p:par>
-                                <p:cTn id="17" presetID="2" presetClass="entr" presetSubtype="4" fill="hold" grpId="0" nodeType="withEffect">
-                                  <p:stCondLst>
-                                    <p:cond delay="0"/>
-                                  </p:stCondLst>
-                                  <p:childTnLst>
-                                    <p:set>
-                                      <p:cBhvr>
-                                        <p:cTn id="18" dur="1" fill="hold">
-                                          <p:stCondLst>
-                                            <p:cond delay="0"/>
-                                          </p:stCondLst>
-                                        </p:cTn>
-                                        <p:tgtEl>
-                                          <p:spTgt spid="9"/>
-                                        </p:tgtEl>
-                                        <p:attrNameLst>
-                                          <p:attrName>style.visibility</p:attrName>
-                                        </p:attrNameLst>
-                                      </p:cBhvr>
-                                      <p:to>
-                                        <p:strVal val="visible"/>
-                                      </p:to>
-                                    </p:set>
-                                    <p:anim calcmode="lin" valueType="num">
-                                      <p:cBhvr additive="base">
-                                        <p:cTn id="19" dur="500" fill="hold"/>
-                                        <p:tgtEl>
-                                          <p:spTgt spid="9"/>
-                                        </p:tgtEl>
-                                        <p:attrNameLst>
-                                          <p:attrName>ppt_x</p:attrName>
-                                        </p:attrNameLst>
-                                      </p:cBhvr>
-                                      <p:tavLst>
-                                        <p:tav tm="0">
-                                          <p:val>
-                                            <p:strVal val="#ppt_x"/>
-                                          </p:val>
-                                        </p:tav>
-                                        <p:tav tm="100000">
-                                          <p:val>
-                                            <p:strVal val="#ppt_x"/>
-                                          </p:val>
-                                        </p:tav>
-                                      </p:tavLst>
-                                    </p:anim>
-                                    <p:anim calcmode="lin" valueType="num">
-                                      <p:cBhvr additive="base">
-                                        <p:cTn id="20" dur="500" fill="hold"/>
-                                        <p:tgtEl>
-                                          <p:spTgt spid="9"/>
-                                        </p:tgtEl>
-                                        <p:attrNameLst>
-                                          <p:attrName>ppt_y</p:attrName>
-                                        </p:attrNameLst>
-                                      </p:cBhvr>
-                                      <p:tavLst>
-                                        <p:tav tm="0">
-                                          <p:val>
-                                            <p:strVal val="1+#ppt_h/2"/>
-                                          </p:val>
-                                        </p:tav>
-                                        <p:tav tm="100000">
-                                          <p:val>
-                                            <p:strVal val="#ppt_y"/>
-                                          </p:val>
-                                        </p:tav>
-                                      </p:tavLst>
-                                    </p:anim>
-                                  </p:childTnLst>
-                                </p:cTn>
-                              </p:par>
                             </p:childTnLst>
                           </p:cTn>
                         </p:par>
@@ -31965,13 +31429,12 @@
       <p:bldP spid="8" grpId="0" animBg="1"/>
       <p:bldP spid="10" grpId="0" animBg="1"/>
       <p:bldP spid="6" grpId="0" animBg="1"/>
-      <p:bldP spid="9" grpId="0" animBg="1"/>
     </p:bldLst>
   </p:timing>
 </p:sld>
 </file>
 
-<file path=ppt/slides/slide13.xml><?xml version="1.0" encoding="utf-8"?>
+<file path=ppt/slides/slide11.xml><?xml version="1.0" encoding="utf-8"?>
 <p:sld xmlns:a="http://schemas.openxmlformats.org/drawingml/2006/main" xmlns:r="http://schemas.openxmlformats.org/officeDocument/2006/relationships" xmlns:p="http://schemas.openxmlformats.org/presentationml/2006/main">
   <p:cSld>
     <p:spTree>
@@ -32040,7 +31503,7 @@
             <a:fld id="{C263D6C4-4840-40CC-AC84-17E24B3B7BDE}" type="slidenum">
               <a:rPr lang="en-US" noProof="0" smtClean="0"/>
               <a:pPr/>
-              <a:t>13</a:t>
+              <a:t>11</a:t>
             </a:fld>
             <a:endParaRPr lang="en-US" noProof="0" dirty="0"/>
           </a:p>
@@ -32222,8 +31685,8 @@
         </p:nvSpPr>
         <p:spPr>
           <a:xfrm>
-            <a:off x="7412182" y="3131127"/>
-            <a:ext cx="1191491" cy="1177637"/>
+            <a:off x="7072113" y="2982985"/>
+            <a:ext cx="1846118" cy="1673315"/>
           </a:xfrm>
           <a:prstGeom prst="flowChartConnector">
             <a:avLst/>
@@ -32270,7 +31733,7 @@
 </p:sld>
 </file>
 
-<file path=ppt/slides/slide14.xml><?xml version="1.0" encoding="utf-8"?>
+<file path=ppt/slides/slide12.xml><?xml version="1.0" encoding="utf-8"?>
 <p:sld xmlns:a="http://schemas.openxmlformats.org/drawingml/2006/main" xmlns:r="http://schemas.openxmlformats.org/officeDocument/2006/relationships" xmlns:p="http://schemas.openxmlformats.org/presentationml/2006/main" showMasterSp="0">
   <p:cSld>
     <p:bg>
@@ -32411,672 +31874,6 @@
           <p:cNvPr id="4" name="Title 3">
             <a:extLst>
               <a:ext uri="{FF2B5EF4-FFF2-40B4-BE49-F238E27FC236}">
-                <a16:creationId xmlns:a16="http://schemas.microsoft.com/office/drawing/2014/main" id="{E3BD8413-C238-49D7-A4E1-E8FEF1811A0E}"/>
-              </a:ext>
-            </a:extLst>
-          </p:cNvPr>
-          <p:cNvSpPr>
-            <a:spLocks noGrp="1"/>
-          </p:cNvSpPr>
-          <p:nvPr>
-            <p:ph type="title"/>
-          </p:nvPr>
-        </p:nvSpPr>
-        <p:spPr>
-          <a:xfrm>
-            <a:off x="500799" y="785191"/>
-            <a:ext cx="7781544" cy="859055"/>
-          </a:xfrm>
-        </p:spPr>
-        <p:txBody>
-          <a:bodyPr>
-            <a:normAutofit fontScale="90000"/>
-          </a:bodyPr>
-          <a:lstStyle/>
-          <a:p>
-            <a:r>
-              <a:rPr lang="en-US" dirty="0"/>
-              <a:t>Motivation of the project</a:t>
-            </a:r>
-          </a:p>
-        </p:txBody>
-      </p:sp>
-      <p:sp>
-        <p:nvSpPr>
-          <p:cNvPr id="5" name="Text Placeholder 4">
-            <a:extLst>
-              <a:ext uri="{FF2B5EF4-FFF2-40B4-BE49-F238E27FC236}">
-                <a16:creationId xmlns:a16="http://schemas.microsoft.com/office/drawing/2014/main" id="{0A95F4DE-39B7-4CE2-BC1E-8B8AE662A895}"/>
-              </a:ext>
-            </a:extLst>
-          </p:cNvPr>
-          <p:cNvSpPr>
-            <a:spLocks noGrp="1"/>
-          </p:cNvSpPr>
-          <p:nvPr>
-            <p:ph type="body" idx="1"/>
-          </p:nvPr>
-        </p:nvSpPr>
-        <p:spPr/>
-        <p:txBody>
-          <a:bodyPr>
-            <a:noAutofit/>
-          </a:bodyPr>
-          <a:lstStyle/>
-          <a:p>
-            <a:endParaRPr lang="en-US" dirty="0">
-              <a:solidFill>
-                <a:srgbClr val="FFFF00"/>
-              </a:solidFill>
-            </a:endParaRPr>
-          </a:p>
-        </p:txBody>
-      </p:sp>
-      <p:sp>
-        <p:nvSpPr>
-          <p:cNvPr id="2" name="Slide Number Placeholder 1">
-            <a:extLst>
-              <a:ext uri="{FF2B5EF4-FFF2-40B4-BE49-F238E27FC236}">
-                <a16:creationId xmlns:a16="http://schemas.microsoft.com/office/drawing/2014/main" id="{0B24BF10-2B55-43AB-9F77-F1A1410384A9}"/>
-              </a:ext>
-            </a:extLst>
-          </p:cNvPr>
-          <p:cNvSpPr>
-            <a:spLocks noGrp="1"/>
-          </p:cNvSpPr>
-          <p:nvPr>
-            <p:ph type="sldNum" sz="quarter" idx="12"/>
-          </p:nvPr>
-        </p:nvSpPr>
-        <p:spPr/>
-        <p:txBody>
-          <a:bodyPr/>
-          <a:lstStyle/>
-          <a:p>
-            <a:fld id="{C263D6C4-4840-40CC-AC84-17E24B3B7BDE}" type="slidenum">
-              <a:rPr lang="en-US" smtClean="0"/>
-              <a:pPr/>
-              <a:t>2</a:t>
-            </a:fld>
-            <a:endParaRPr lang="en-US" dirty="0"/>
-          </a:p>
-        </p:txBody>
-      </p:sp>
-      <p:sp>
-        <p:nvSpPr>
-          <p:cNvPr id="3" name="Rectangle: Rounded Corners 2">
-            <a:extLst>
-              <a:ext uri="{FF2B5EF4-FFF2-40B4-BE49-F238E27FC236}">
-                <a16:creationId xmlns:a16="http://schemas.microsoft.com/office/drawing/2014/main" id="{FA129915-73DF-48D7-8E52-10EF3962DC40}"/>
-              </a:ext>
-            </a:extLst>
-          </p:cNvPr>
-          <p:cNvSpPr/>
-          <p:nvPr/>
-        </p:nvSpPr>
-        <p:spPr>
-          <a:xfrm>
-            <a:off x="1509252" y="1872870"/>
-            <a:ext cx="8509000" cy="859055"/>
-          </a:xfrm>
-          <a:prstGeom prst="roundRect">
-            <a:avLst/>
-          </a:prstGeom>
-        </p:spPr>
-        <p:style>
-          <a:lnRef idx="2">
-            <a:schemeClr val="accent1">
-              <a:shade val="50000"/>
-            </a:schemeClr>
-          </a:lnRef>
-          <a:fillRef idx="1">
-            <a:schemeClr val="accent1"/>
-          </a:fillRef>
-          <a:effectRef idx="0">
-            <a:schemeClr val="accent1"/>
-          </a:effectRef>
-          <a:fontRef idx="minor">
-            <a:schemeClr val="lt1"/>
-          </a:fontRef>
-        </p:style>
-        <p:txBody>
-          <a:bodyPr rtlCol="0" anchor="ctr"/>
-          <a:lstStyle/>
-          <a:p>
-            <a:pPr marL="285750" indent="-285750">
-              <a:buFont typeface="Wingdings" panose="05000000000000000000" pitchFamily="2" charset="2"/>
-              <a:buChar char="q"/>
-            </a:pPr>
-            <a:r>
-              <a:rPr lang="en-US" dirty="0">
-                <a:solidFill>
-                  <a:srgbClr val="FFFF00"/>
-                </a:solidFill>
-              </a:rPr>
-              <a:t>Equation is the part of educational life.</a:t>
-            </a:r>
-          </a:p>
-        </p:txBody>
-      </p:sp>
-      <p:sp>
-        <p:nvSpPr>
-          <p:cNvPr id="7" name="Rectangle: Rounded Corners 6">
-            <a:extLst>
-              <a:ext uri="{FF2B5EF4-FFF2-40B4-BE49-F238E27FC236}">
-                <a16:creationId xmlns:a16="http://schemas.microsoft.com/office/drawing/2014/main" id="{47982D29-3E0B-48A0-9854-8CB1E1DA98DA}"/>
-              </a:ext>
-            </a:extLst>
-          </p:cNvPr>
-          <p:cNvSpPr/>
-          <p:nvPr/>
-        </p:nvSpPr>
-        <p:spPr>
-          <a:xfrm>
-            <a:off x="2143860" y="3007424"/>
-            <a:ext cx="8509000" cy="859055"/>
-          </a:xfrm>
-          <a:prstGeom prst="roundRect">
-            <a:avLst/>
-          </a:prstGeom>
-        </p:spPr>
-        <p:style>
-          <a:lnRef idx="2">
-            <a:schemeClr val="accent1">
-              <a:shade val="50000"/>
-            </a:schemeClr>
-          </a:lnRef>
-          <a:fillRef idx="1">
-            <a:schemeClr val="accent1"/>
-          </a:fillRef>
-          <a:effectRef idx="0">
-            <a:schemeClr val="accent1"/>
-          </a:effectRef>
-          <a:fontRef idx="minor">
-            <a:schemeClr val="lt1"/>
-          </a:fontRef>
-        </p:style>
-        <p:txBody>
-          <a:bodyPr rtlCol="0" anchor="ctr"/>
-          <a:lstStyle/>
-          <a:p>
-            <a:pPr marL="285750" indent="-285750">
-              <a:buFont typeface="Wingdings" panose="05000000000000000000" pitchFamily="2" charset="2"/>
-              <a:buChar char="q"/>
-            </a:pPr>
-            <a:r>
-              <a:rPr lang="en-US" dirty="0">
-                <a:solidFill>
-                  <a:srgbClr val="FFFF00"/>
-                </a:solidFill>
-              </a:rPr>
-              <a:t>Solving the  large equation is very tough for humans.</a:t>
-            </a:r>
-          </a:p>
-        </p:txBody>
-      </p:sp>
-      <p:sp>
-        <p:nvSpPr>
-          <p:cNvPr id="6" name="Rectangle: Rounded Corners 5">
-            <a:extLst>
-              <a:ext uri="{FF2B5EF4-FFF2-40B4-BE49-F238E27FC236}">
-                <a16:creationId xmlns:a16="http://schemas.microsoft.com/office/drawing/2014/main" id="{1E4C1794-3187-474A-83E9-F28FFF3D1604}"/>
-              </a:ext>
-            </a:extLst>
-          </p:cNvPr>
-          <p:cNvSpPr/>
-          <p:nvPr/>
-        </p:nvSpPr>
-        <p:spPr>
-          <a:xfrm>
-            <a:off x="2851150" y="4203882"/>
-            <a:ext cx="8509000" cy="859055"/>
-          </a:xfrm>
-          <a:prstGeom prst="roundRect">
-            <a:avLst/>
-          </a:prstGeom>
-        </p:spPr>
-        <p:style>
-          <a:lnRef idx="2">
-            <a:schemeClr val="accent1">
-              <a:shade val="50000"/>
-            </a:schemeClr>
-          </a:lnRef>
-          <a:fillRef idx="1">
-            <a:schemeClr val="accent1"/>
-          </a:fillRef>
-          <a:effectRef idx="0">
-            <a:schemeClr val="accent1"/>
-          </a:effectRef>
-          <a:fontRef idx="minor">
-            <a:schemeClr val="lt1"/>
-          </a:fontRef>
-        </p:style>
-        <p:txBody>
-          <a:bodyPr rtlCol="0" anchor="ctr"/>
-          <a:lstStyle/>
-          <a:p>
-            <a:pPr marL="285750" indent="-285750">
-              <a:buFont typeface="Wingdings" panose="05000000000000000000" pitchFamily="2" charset="2"/>
-              <a:buChar char="q"/>
-            </a:pPr>
-            <a:r>
-              <a:rPr lang="en-US" dirty="0">
-                <a:solidFill>
-                  <a:srgbClr val="FFFF00"/>
-                </a:solidFill>
-              </a:rPr>
-              <a:t>Higher power polynomial equation is very troublesome</a:t>
-            </a:r>
-          </a:p>
-        </p:txBody>
-      </p:sp>
-      <p:sp>
-        <p:nvSpPr>
-          <p:cNvPr id="8" name="Rectangle: Rounded Corners 7">
-            <a:extLst>
-              <a:ext uri="{FF2B5EF4-FFF2-40B4-BE49-F238E27FC236}">
-                <a16:creationId xmlns:a16="http://schemas.microsoft.com/office/drawing/2014/main" id="{24F7C483-6B8D-41D1-99BF-508DE1E3ECA5}"/>
-              </a:ext>
-            </a:extLst>
-          </p:cNvPr>
-          <p:cNvSpPr/>
-          <p:nvPr/>
-        </p:nvSpPr>
-        <p:spPr>
-          <a:xfrm>
-            <a:off x="3515254" y="5372702"/>
-            <a:ext cx="8509000" cy="859055"/>
-          </a:xfrm>
-          <a:prstGeom prst="roundRect">
-            <a:avLst/>
-          </a:prstGeom>
-        </p:spPr>
-        <p:style>
-          <a:lnRef idx="2">
-            <a:schemeClr val="accent1">
-              <a:shade val="50000"/>
-            </a:schemeClr>
-          </a:lnRef>
-          <a:fillRef idx="1">
-            <a:schemeClr val="accent1"/>
-          </a:fillRef>
-          <a:effectRef idx="0">
-            <a:schemeClr val="accent1"/>
-          </a:effectRef>
-          <a:fontRef idx="minor">
-            <a:schemeClr val="lt1"/>
-          </a:fontRef>
-        </p:style>
-        <p:txBody>
-          <a:bodyPr rtlCol="0" anchor="ctr"/>
-          <a:lstStyle/>
-          <a:p>
-            <a:pPr marL="285750" indent="-285750">
-              <a:buFont typeface="Wingdings" panose="05000000000000000000" pitchFamily="2" charset="2"/>
-              <a:buChar char="q"/>
-            </a:pPr>
-            <a:r>
-              <a:rPr lang="en-US" dirty="0">
-                <a:solidFill>
-                  <a:srgbClr val="FFFF00"/>
-                </a:solidFill>
-              </a:rPr>
-              <a:t>Three or upper number variable can’t solve graphically in linear programming</a:t>
-            </a:r>
-          </a:p>
-        </p:txBody>
-      </p:sp>
-    </p:spTree>
-    <p:extLst>
-      <p:ext uri="{BB962C8B-B14F-4D97-AF65-F5344CB8AC3E}">
-        <p14:creationId xmlns:p14="http://schemas.microsoft.com/office/powerpoint/2010/main" val="2902794312"/>
-      </p:ext>
-    </p:extLst>
-  </p:cSld>
-  <p:clrMapOvr>
-    <a:masterClrMapping/>
-  </p:clrMapOvr>
-  <mc:AlternateContent xmlns:mc="http://schemas.openxmlformats.org/markup-compatibility/2006" xmlns:p14="http://schemas.microsoft.com/office/powerpoint/2010/main">
-    <mc:Choice Requires="p14">
-      <p:transition spd="med" p14:dur="700">
-        <p:fade/>
-      </p:transition>
-    </mc:Choice>
-    <mc:Fallback xmlns="">
-      <p:transition spd="med">
-        <p:fade/>
-      </p:transition>
-    </mc:Fallback>
-  </mc:AlternateContent>
-  <p:timing>
-    <p:tnLst>
-      <p:par>
-        <p:cTn id="1" dur="indefinite" restart="never" nodeType="tmRoot">
-          <p:childTnLst>
-            <p:seq concurrent="1" nextAc="seek">
-              <p:cTn id="2" dur="indefinite" nodeType="mainSeq">
-                <p:childTnLst>
-                  <p:par>
-                    <p:cTn id="3" fill="hold">
-                      <p:stCondLst>
-                        <p:cond delay="indefinite"/>
-                      </p:stCondLst>
-                      <p:childTnLst>
-                        <p:par>
-                          <p:cTn id="4" fill="hold">
-                            <p:stCondLst>
-                              <p:cond delay="0"/>
-                            </p:stCondLst>
-                            <p:childTnLst>
-                              <p:par>
-                                <p:cTn id="5" presetID="42" presetClass="entr" presetSubtype="0" fill="hold" grpId="0" nodeType="clickEffect">
-                                  <p:stCondLst>
-                                    <p:cond delay="0"/>
-                                  </p:stCondLst>
-                                  <p:childTnLst>
-                                    <p:set>
-                                      <p:cBhvr>
-                                        <p:cTn id="6" dur="1" fill="hold">
-                                          <p:stCondLst>
-                                            <p:cond delay="0"/>
-                                          </p:stCondLst>
-                                        </p:cTn>
-                                        <p:tgtEl>
-                                          <p:spTgt spid="3"/>
-                                        </p:tgtEl>
-                                        <p:attrNameLst>
-                                          <p:attrName>style.visibility</p:attrName>
-                                        </p:attrNameLst>
-                                      </p:cBhvr>
-                                      <p:to>
-                                        <p:strVal val="visible"/>
-                                      </p:to>
-                                    </p:set>
-                                    <p:animEffect transition="in" filter="fade">
-                                      <p:cBhvr>
-                                        <p:cTn id="7" dur="1000"/>
-                                        <p:tgtEl>
-                                          <p:spTgt spid="3"/>
-                                        </p:tgtEl>
-                                      </p:cBhvr>
-                                    </p:animEffect>
-                                    <p:anim calcmode="lin" valueType="num">
-                                      <p:cBhvr>
-                                        <p:cTn id="8" dur="1000" fill="hold"/>
-                                        <p:tgtEl>
-                                          <p:spTgt spid="3"/>
-                                        </p:tgtEl>
-                                        <p:attrNameLst>
-                                          <p:attrName>ppt_x</p:attrName>
-                                        </p:attrNameLst>
-                                      </p:cBhvr>
-                                      <p:tavLst>
-                                        <p:tav tm="0">
-                                          <p:val>
-                                            <p:strVal val="#ppt_x"/>
-                                          </p:val>
-                                        </p:tav>
-                                        <p:tav tm="100000">
-                                          <p:val>
-                                            <p:strVal val="#ppt_x"/>
-                                          </p:val>
-                                        </p:tav>
-                                      </p:tavLst>
-                                    </p:anim>
-                                    <p:anim calcmode="lin" valueType="num">
-                                      <p:cBhvr>
-                                        <p:cTn id="9" dur="1000" fill="hold"/>
-                                        <p:tgtEl>
-                                          <p:spTgt spid="3"/>
-                                        </p:tgtEl>
-                                        <p:attrNameLst>
-                                          <p:attrName>ppt_y</p:attrName>
-                                        </p:attrNameLst>
-                                      </p:cBhvr>
-                                      <p:tavLst>
-                                        <p:tav tm="0">
-                                          <p:val>
-                                            <p:strVal val="#ppt_y+.1"/>
-                                          </p:val>
-                                        </p:tav>
-                                        <p:tav tm="100000">
-                                          <p:val>
-                                            <p:strVal val="#ppt_y"/>
-                                          </p:val>
-                                        </p:tav>
-                                      </p:tavLst>
-                                    </p:anim>
-                                  </p:childTnLst>
-                                </p:cTn>
-                              </p:par>
-                              <p:par>
-                                <p:cTn id="10" presetID="42" presetClass="entr" presetSubtype="0" fill="hold" grpId="0" nodeType="withEffect">
-                                  <p:stCondLst>
-                                    <p:cond delay="0"/>
-                                  </p:stCondLst>
-                                  <p:childTnLst>
-                                    <p:set>
-                                      <p:cBhvr>
-                                        <p:cTn id="11" dur="1" fill="hold">
-                                          <p:stCondLst>
-                                            <p:cond delay="0"/>
-                                          </p:stCondLst>
-                                        </p:cTn>
-                                        <p:tgtEl>
-                                          <p:spTgt spid="7"/>
-                                        </p:tgtEl>
-                                        <p:attrNameLst>
-                                          <p:attrName>style.visibility</p:attrName>
-                                        </p:attrNameLst>
-                                      </p:cBhvr>
-                                      <p:to>
-                                        <p:strVal val="visible"/>
-                                      </p:to>
-                                    </p:set>
-                                    <p:animEffect transition="in" filter="fade">
-                                      <p:cBhvr>
-                                        <p:cTn id="12" dur="1000"/>
-                                        <p:tgtEl>
-                                          <p:spTgt spid="7"/>
-                                        </p:tgtEl>
-                                      </p:cBhvr>
-                                    </p:animEffect>
-                                    <p:anim calcmode="lin" valueType="num">
-                                      <p:cBhvr>
-                                        <p:cTn id="13" dur="1000" fill="hold"/>
-                                        <p:tgtEl>
-                                          <p:spTgt spid="7"/>
-                                        </p:tgtEl>
-                                        <p:attrNameLst>
-                                          <p:attrName>ppt_x</p:attrName>
-                                        </p:attrNameLst>
-                                      </p:cBhvr>
-                                      <p:tavLst>
-                                        <p:tav tm="0">
-                                          <p:val>
-                                            <p:strVal val="#ppt_x"/>
-                                          </p:val>
-                                        </p:tav>
-                                        <p:tav tm="100000">
-                                          <p:val>
-                                            <p:strVal val="#ppt_x"/>
-                                          </p:val>
-                                        </p:tav>
-                                      </p:tavLst>
-                                    </p:anim>
-                                    <p:anim calcmode="lin" valueType="num">
-                                      <p:cBhvr>
-                                        <p:cTn id="14" dur="1000" fill="hold"/>
-                                        <p:tgtEl>
-                                          <p:spTgt spid="7"/>
-                                        </p:tgtEl>
-                                        <p:attrNameLst>
-                                          <p:attrName>ppt_y</p:attrName>
-                                        </p:attrNameLst>
-                                      </p:cBhvr>
-                                      <p:tavLst>
-                                        <p:tav tm="0">
-                                          <p:val>
-                                            <p:strVal val="#ppt_y+.1"/>
-                                          </p:val>
-                                        </p:tav>
-                                        <p:tav tm="100000">
-                                          <p:val>
-                                            <p:strVal val="#ppt_y"/>
-                                          </p:val>
-                                        </p:tav>
-                                      </p:tavLst>
-                                    </p:anim>
-                                  </p:childTnLst>
-                                </p:cTn>
-                              </p:par>
-                            </p:childTnLst>
-                          </p:cTn>
-                        </p:par>
-                      </p:childTnLst>
-                    </p:cTn>
-                  </p:par>
-                  <p:par>
-                    <p:cTn id="15" fill="hold">
-                      <p:stCondLst>
-                        <p:cond delay="indefinite"/>
-                      </p:stCondLst>
-                      <p:childTnLst>
-                        <p:par>
-                          <p:cTn id="16" fill="hold">
-                            <p:stCondLst>
-                              <p:cond delay="0"/>
-                            </p:stCondLst>
-                            <p:childTnLst>
-                              <p:par>
-                                <p:cTn id="17" presetID="22" presetClass="entr" presetSubtype="4" fill="hold" grpId="0" nodeType="clickEffect">
-                                  <p:stCondLst>
-                                    <p:cond delay="0"/>
-                                  </p:stCondLst>
-                                  <p:childTnLst>
-                                    <p:set>
-                                      <p:cBhvr>
-                                        <p:cTn id="18" dur="1" fill="hold">
-                                          <p:stCondLst>
-                                            <p:cond delay="0"/>
-                                          </p:stCondLst>
-                                        </p:cTn>
-                                        <p:tgtEl>
-                                          <p:spTgt spid="6"/>
-                                        </p:tgtEl>
-                                        <p:attrNameLst>
-                                          <p:attrName>style.visibility</p:attrName>
-                                        </p:attrNameLst>
-                                      </p:cBhvr>
-                                      <p:to>
-                                        <p:strVal val="visible"/>
-                                      </p:to>
-                                    </p:set>
-                                    <p:animEffect transition="in" filter="wipe(down)">
-                                      <p:cBhvr>
-                                        <p:cTn id="19" dur="500"/>
-                                        <p:tgtEl>
-                                          <p:spTgt spid="6"/>
-                                        </p:tgtEl>
-                                      </p:cBhvr>
-                                    </p:animEffect>
-                                  </p:childTnLst>
-                                </p:cTn>
-                              </p:par>
-                              <p:par>
-                                <p:cTn id="20" presetID="22" presetClass="entr" presetSubtype="4" fill="hold" grpId="0" nodeType="withEffect">
-                                  <p:stCondLst>
-                                    <p:cond delay="0"/>
-                                  </p:stCondLst>
-                                  <p:childTnLst>
-                                    <p:set>
-                                      <p:cBhvr>
-                                        <p:cTn id="21" dur="1" fill="hold">
-                                          <p:stCondLst>
-                                            <p:cond delay="0"/>
-                                          </p:stCondLst>
-                                        </p:cTn>
-                                        <p:tgtEl>
-                                          <p:spTgt spid="8"/>
-                                        </p:tgtEl>
-                                        <p:attrNameLst>
-                                          <p:attrName>style.visibility</p:attrName>
-                                        </p:attrNameLst>
-                                      </p:cBhvr>
-                                      <p:to>
-                                        <p:strVal val="visible"/>
-                                      </p:to>
-                                    </p:set>
-                                    <p:animEffect transition="in" filter="wipe(down)">
-                                      <p:cBhvr>
-                                        <p:cTn id="22" dur="500"/>
-                                        <p:tgtEl>
-                                          <p:spTgt spid="8"/>
-                                        </p:tgtEl>
-                                      </p:cBhvr>
-                                    </p:animEffect>
-                                  </p:childTnLst>
-                                </p:cTn>
-                              </p:par>
-                            </p:childTnLst>
-                          </p:cTn>
-                        </p:par>
-                      </p:childTnLst>
-                    </p:cTn>
-                  </p:par>
-                </p:childTnLst>
-              </p:cTn>
-              <p:prevCondLst>
-                <p:cond evt="onPrev" delay="0">
-                  <p:tgtEl>
-                    <p:sldTgt/>
-                  </p:tgtEl>
-                </p:cond>
-              </p:prevCondLst>
-              <p:nextCondLst>
-                <p:cond evt="onNext" delay="0">
-                  <p:tgtEl>
-                    <p:sldTgt/>
-                  </p:tgtEl>
-                </p:cond>
-              </p:nextCondLst>
-            </p:seq>
-          </p:childTnLst>
-        </p:cTn>
-      </p:par>
-    </p:tnLst>
-    <p:bldLst>
-      <p:bldP spid="3" grpId="0" animBg="1"/>
-      <p:bldP spid="7" grpId="0" animBg="1"/>
-      <p:bldP spid="6" grpId="0" animBg="1"/>
-      <p:bldP spid="8" grpId="0" animBg="1"/>
-    </p:bldLst>
-  </p:timing>
-</p:sld>
-</file>
-
-<file path=ppt/slides/slide3.xml><?xml version="1.0" encoding="utf-8"?>
-<p:sld xmlns:a="http://schemas.openxmlformats.org/drawingml/2006/main" xmlns:r="http://schemas.openxmlformats.org/officeDocument/2006/relationships" xmlns:p="http://schemas.openxmlformats.org/presentationml/2006/main">
-  <p:cSld>
-    <p:spTree>
-      <p:nvGrpSpPr>
-        <p:cNvPr id="1" name=""/>
-        <p:cNvGrpSpPr/>
-        <p:nvPr/>
-      </p:nvGrpSpPr>
-      <p:grpSpPr>
-        <a:xfrm>
-          <a:off x="0" y="0"/>
-          <a:ext cx="0" cy="0"/>
-          <a:chOff x="0" y="0"/>
-          <a:chExt cx="0" cy="0"/>
-        </a:xfrm>
-      </p:grpSpPr>
-      <p:sp>
-        <p:nvSpPr>
-          <p:cNvPr id="4" name="Title 3">
-            <a:extLst>
-              <a:ext uri="{FF2B5EF4-FFF2-40B4-BE49-F238E27FC236}">
                 <a16:creationId xmlns:a16="http://schemas.microsoft.com/office/drawing/2014/main" id="{BD179B88-D43C-4A31-9A52-3498E9430782}"/>
               </a:ext>
             </a:extLst>
@@ -33161,7 +31958,7 @@
             <a:fld id="{C263D6C4-4840-40CC-AC84-17E24B3B7BDE}" type="slidenum">
               <a:rPr lang="en-US" smtClean="0"/>
               <a:pPr/>
-              <a:t>3</a:t>
+              <a:t>2</a:t>
             </a:fld>
             <a:endParaRPr lang="en-US" dirty="0"/>
           </a:p>
@@ -33661,7 +32458,7 @@
 </p:sld>
 </file>
 
-<file path=ppt/slides/slide4.xml><?xml version="1.0" encoding="utf-8"?>
+<file path=ppt/slides/slide3.xml><?xml version="1.0" encoding="utf-8"?>
 <p:sld xmlns:a="http://schemas.openxmlformats.org/drawingml/2006/main" xmlns:r="http://schemas.openxmlformats.org/officeDocument/2006/relationships" xmlns:p="http://schemas.openxmlformats.org/presentationml/2006/main">
   <p:cSld>
     <p:spTree>
@@ -33814,7 +32611,7 @@
             <a:fld id="{C263D6C4-4840-40CC-AC84-17E24B3B7BDE}" type="slidenum">
               <a:rPr lang="en-US" smtClean="0"/>
               <a:pPr/>
-              <a:t>4</a:t>
+              <a:t>3</a:t>
             </a:fld>
             <a:endParaRPr lang="en-US" dirty="0"/>
           </a:p>
@@ -33905,221 +32702,7 @@
 </p:sld>
 </file>
 
-<file path=ppt/slides/slide5.xml><?xml version="1.0" encoding="utf-8"?>
-<p:sld xmlns:a="http://schemas.openxmlformats.org/drawingml/2006/main" xmlns:r="http://schemas.openxmlformats.org/officeDocument/2006/relationships" xmlns:p="http://schemas.openxmlformats.org/presentationml/2006/main">
-  <p:cSld>
-    <p:spTree>
-      <p:nvGrpSpPr>
-        <p:cNvPr id="1" name=""/>
-        <p:cNvGrpSpPr/>
-        <p:nvPr/>
-      </p:nvGrpSpPr>
-      <p:grpSpPr>
-        <a:xfrm>
-          <a:off x="0" y="0"/>
-          <a:ext cx="0" cy="0"/>
-          <a:chOff x="0" y="0"/>
-          <a:chExt cx="0" cy="0"/>
-        </a:xfrm>
-      </p:grpSpPr>
-      <p:sp>
-        <p:nvSpPr>
-          <p:cNvPr id="4" name="Title 3">
-            <a:extLst>
-              <a:ext uri="{FF2B5EF4-FFF2-40B4-BE49-F238E27FC236}">
-                <a16:creationId xmlns:a16="http://schemas.microsoft.com/office/drawing/2014/main" id="{315E3981-F0D7-482C-A8E0-6A57700BECA7}"/>
-              </a:ext>
-            </a:extLst>
-          </p:cNvPr>
-          <p:cNvSpPr>
-            <a:spLocks noGrp="1"/>
-          </p:cNvSpPr>
-          <p:nvPr>
-            <p:ph type="title"/>
-          </p:nvPr>
-        </p:nvSpPr>
-        <p:spPr/>
-        <p:txBody>
-          <a:bodyPr/>
-          <a:lstStyle/>
-          <a:p>
-            <a:r>
-              <a:rPr lang="en-US" dirty="0"/>
-              <a:t>Why efficient </a:t>
-            </a:r>
-            <a:r>
-              <a:rPr lang="en-US" sz="1200" dirty="0"/>
-              <a:t>(user perspective)</a:t>
-            </a:r>
-          </a:p>
-        </p:txBody>
-      </p:sp>
-      <p:sp>
-        <p:nvSpPr>
-          <p:cNvPr id="2" name="Slide Number Placeholder 1">
-            <a:extLst>
-              <a:ext uri="{FF2B5EF4-FFF2-40B4-BE49-F238E27FC236}">
-                <a16:creationId xmlns:a16="http://schemas.microsoft.com/office/drawing/2014/main" id="{520FC4EE-F318-4344-9E3C-B950ADB63865}"/>
-              </a:ext>
-            </a:extLst>
-          </p:cNvPr>
-          <p:cNvSpPr>
-            <a:spLocks noGrp="1"/>
-          </p:cNvSpPr>
-          <p:nvPr>
-            <p:ph type="sldNum" sz="quarter" idx="12"/>
-          </p:nvPr>
-        </p:nvSpPr>
-        <p:spPr/>
-        <p:txBody>
-          <a:bodyPr/>
-          <a:lstStyle/>
-          <a:p>
-            <a:fld id="{C263D6C4-4840-40CC-AC84-17E24B3B7BDE}" type="slidenum">
-              <a:rPr lang="en-US" smtClean="0"/>
-              <a:pPr/>
-              <a:t>5</a:t>
-            </a:fld>
-            <a:endParaRPr lang="en-US" dirty="0"/>
-          </a:p>
-        </p:txBody>
-      </p:sp>
-      <p:sp>
-        <p:nvSpPr>
-          <p:cNvPr id="8" name="Text Placeholder 7">
-            <a:extLst>
-              <a:ext uri="{FF2B5EF4-FFF2-40B4-BE49-F238E27FC236}">
-                <a16:creationId xmlns:a16="http://schemas.microsoft.com/office/drawing/2014/main" id="{47DC4E62-1A34-4F98-A451-214F1808519C}"/>
-              </a:ext>
-            </a:extLst>
-          </p:cNvPr>
-          <p:cNvSpPr>
-            <a:spLocks noGrp="1"/>
-          </p:cNvSpPr>
-          <p:nvPr>
-            <p:ph type="body" sz="quarter" idx="2"/>
-          </p:nvPr>
-        </p:nvSpPr>
-        <p:spPr/>
-        <p:txBody>
-          <a:bodyPr/>
-          <a:lstStyle/>
-          <a:p>
-            <a:endParaRPr lang="en-US" dirty="0"/>
-          </a:p>
-          <a:p>
-            <a:endParaRPr lang="en-US" dirty="0"/>
-          </a:p>
-        </p:txBody>
-      </p:sp>
-      <p:sp>
-        <p:nvSpPr>
-          <p:cNvPr id="9" name="Text Placeholder 8">
-            <a:extLst>
-              <a:ext uri="{FF2B5EF4-FFF2-40B4-BE49-F238E27FC236}">
-                <a16:creationId xmlns:a16="http://schemas.microsoft.com/office/drawing/2014/main" id="{521AB61D-13A5-4290-A87A-2C1139137BD9}"/>
-              </a:ext>
-            </a:extLst>
-          </p:cNvPr>
-          <p:cNvSpPr>
-            <a:spLocks noGrp="1"/>
-          </p:cNvSpPr>
-          <p:nvPr>
-            <p:ph type="body" idx="1"/>
-          </p:nvPr>
-        </p:nvSpPr>
-        <p:spPr>
-          <a:xfrm>
-            <a:off x="2001078" y="2330518"/>
-            <a:ext cx="10363200" cy="3275151"/>
-          </a:xfrm>
-        </p:spPr>
-        <p:txBody>
-          <a:bodyPr>
-            <a:normAutofit lnSpcReduction="10000"/>
-          </a:bodyPr>
-          <a:lstStyle/>
-          <a:p>
-            <a:pPr marL="342900" indent="-342900" algn="l">
-              <a:lnSpc>
-                <a:spcPct val="250000"/>
-              </a:lnSpc>
-              <a:buFont typeface="Wingdings" panose="05000000000000000000" pitchFamily="2" charset="2"/>
-              <a:buChar char="q"/>
-            </a:pPr>
-            <a:r>
-              <a:rPr lang="en-US" dirty="0"/>
-              <a:t>No need to arrange equations in standard form.</a:t>
-            </a:r>
-          </a:p>
-          <a:p>
-            <a:pPr marL="342900" indent="-342900" algn="l">
-              <a:lnSpc>
-                <a:spcPct val="250000"/>
-              </a:lnSpc>
-              <a:buFont typeface="Wingdings" panose="05000000000000000000" pitchFamily="2" charset="2"/>
-              <a:buChar char="q"/>
-            </a:pPr>
-            <a:r>
-              <a:rPr lang="en-US" dirty="0"/>
-              <a:t>No need to count the number of variables.</a:t>
-            </a:r>
-          </a:p>
-          <a:p>
-            <a:pPr marL="342900" indent="-342900" algn="l">
-              <a:lnSpc>
-                <a:spcPct val="250000"/>
-              </a:lnSpc>
-              <a:buFont typeface="Wingdings" panose="05000000000000000000" pitchFamily="2" charset="2"/>
-              <a:buChar char="q"/>
-            </a:pPr>
-            <a:r>
-              <a:rPr lang="en-US" dirty="0"/>
-              <a:t>No need to input a fixed variable name.</a:t>
-            </a:r>
-          </a:p>
-          <a:p>
-            <a:pPr marL="342900" indent="-342900" algn="l">
-              <a:lnSpc>
-                <a:spcPct val="250000"/>
-              </a:lnSpc>
-              <a:buFont typeface="Wingdings" panose="05000000000000000000" pitchFamily="2" charset="2"/>
-              <a:buChar char="q"/>
-            </a:pPr>
-            <a:r>
-              <a:rPr lang="en-US"/>
-              <a:t>Handle big data</a:t>
-            </a:r>
-            <a:endParaRPr lang="en-US" dirty="0"/>
-          </a:p>
-        </p:txBody>
-      </p:sp>
-    </p:spTree>
-    <p:extLst>
-      <p:ext uri="{BB962C8B-B14F-4D97-AF65-F5344CB8AC3E}">
-        <p14:creationId xmlns:p14="http://schemas.microsoft.com/office/powerpoint/2010/main" val="3607270498"/>
-      </p:ext>
-    </p:extLst>
-  </p:cSld>
-  <p:clrMapOvr>
-    <a:masterClrMapping/>
-  </p:clrMapOvr>
-  <mc:AlternateContent xmlns:mc="http://schemas.openxmlformats.org/markup-compatibility/2006" xmlns:p14="http://schemas.microsoft.com/office/powerpoint/2010/main">
-    <mc:Choice Requires="p14">
-      <p:transition spd="med" p14:dur="700">
-        <p:fade/>
-      </p:transition>
-    </mc:Choice>
-    <mc:Fallback xmlns="">
-      <p:transition spd="med">
-        <p:fade/>
-      </p:transition>
-    </mc:Fallback>
-  </mc:AlternateContent>
-</p:sld>
-</file>
-
-<file path=ppt/slides/slide6.xml><?xml version="1.0" encoding="utf-8"?>
+<file path=ppt/slides/slide4.xml><?xml version="1.0" encoding="utf-8"?>
 <p:sld xmlns:a="http://schemas.openxmlformats.org/drawingml/2006/main" xmlns:r="http://schemas.openxmlformats.org/officeDocument/2006/relationships" xmlns:p="http://schemas.openxmlformats.org/presentationml/2006/main">
   <p:cSld>
     <p:spTree>
@@ -34188,7 +32771,7 @@
             <a:fld id="{C263D6C4-4840-40CC-AC84-17E24B3B7BDE}" type="slidenum">
               <a:rPr lang="en-US" noProof="0" smtClean="0"/>
               <a:pPr/>
-              <a:t>6</a:t>
+              <a:t>4</a:t>
             </a:fld>
             <a:endParaRPr lang="en-US" noProof="0" dirty="0"/>
           </a:p>
@@ -34373,7 +32956,7 @@
 </p:sld>
 </file>
 
-<file path=ppt/slides/slide7.xml><?xml version="1.0" encoding="utf-8"?>
+<file path=ppt/slides/slide5.xml><?xml version="1.0" encoding="utf-8"?>
 <p:sld xmlns:a="http://schemas.openxmlformats.org/drawingml/2006/main" xmlns:r="http://schemas.openxmlformats.org/officeDocument/2006/relationships" xmlns:p="http://schemas.openxmlformats.org/presentationml/2006/main">
   <p:cSld>
     <p:spTree>
@@ -34431,7 +33014,7 @@
             <a:fld id="{C263D6C4-4840-40CC-AC84-17E24B3B7BDE}" type="slidenum">
               <a:rPr lang="en-US" noProof="0" smtClean="0"/>
               <a:pPr/>
-              <a:t>7</a:t>
+              <a:t>5</a:t>
             </a:fld>
             <a:endParaRPr lang="en-US" noProof="0" dirty="0"/>
           </a:p>
@@ -34915,7 +33498,7 @@
 </p:sld>
 </file>
 
-<file path=ppt/slides/slide8.xml><?xml version="1.0" encoding="utf-8"?>
+<file path=ppt/slides/slide6.xml><?xml version="1.0" encoding="utf-8"?>
 <p:sld xmlns:a="http://schemas.openxmlformats.org/drawingml/2006/main" xmlns:r="http://schemas.openxmlformats.org/officeDocument/2006/relationships" xmlns:p="http://schemas.openxmlformats.org/presentationml/2006/main">
   <p:cSld>
     <p:spTree>
@@ -34984,7 +33567,7 @@
             <a:fld id="{C263D6C4-4840-40CC-AC84-17E24B3B7BDE}" type="slidenum">
               <a:rPr lang="en-US" noProof="0" smtClean="0"/>
               <a:pPr/>
-              <a:t>8</a:t>
+              <a:t>6</a:t>
             </a:fld>
             <a:endParaRPr lang="en-US" noProof="0" dirty="0"/>
           </a:p>
@@ -35004,7 +33587,7 @@
         </p:nvSpPr>
         <p:spPr>
           <a:xfrm>
-            <a:off x="255435" y="1520688"/>
+            <a:off x="2376278" y="2447416"/>
             <a:ext cx="6692349" cy="1272208"/>
           </a:xfrm>
           <a:prstGeom prst="roundRect">
@@ -35013,77 +33596,87 @@
         </p:spPr>
         <p:style>
           <a:lnRef idx="2">
-            <a:schemeClr val="accent1">
-              <a:shade val="50000"/>
-            </a:schemeClr>
+            <a:schemeClr val="accent6"/>
           </a:lnRef>
           <a:fillRef idx="1">
-            <a:schemeClr val="accent1"/>
+            <a:schemeClr val="lt1"/>
           </a:fillRef>
           <a:effectRef idx="0">
-            <a:schemeClr val="accent1"/>
+            <a:schemeClr val="accent6"/>
           </a:effectRef>
           <a:fontRef idx="minor">
-            <a:schemeClr val="lt1"/>
+            <a:schemeClr val="dk1"/>
           </a:fontRef>
         </p:style>
         <p:txBody>
           <a:bodyPr rtlCol="0" anchor="ctr"/>
           <a:lstStyle/>
           <a:p>
-            <a:pPr algn="ctr"/>
             <a:r>
               <a:rPr lang="en-US" dirty="0"/>
-              <a:t>a1(x)^n + a2(x)^n-1 +…………..+a(n-1)x + an / (x^2 + mx + n)</a:t>
+              <a:t>        Divide polynomial equation by a quadratic equation	</a:t>
             </a:r>
           </a:p>
-        </p:txBody>
-      </p:sp>
-      <p:sp>
-        <p:nvSpPr>
-          <p:cNvPr id="11" name="Arrow: Right 10">
-            <a:extLst>
-              <a:ext uri="{FF2B5EF4-FFF2-40B4-BE49-F238E27FC236}">
-                <a16:creationId xmlns:a16="http://schemas.microsoft.com/office/drawing/2014/main" id="{1344E0EC-3FC3-2D93-16C7-C9958CFE347D}"/>
-              </a:ext>
-            </a:extLst>
-          </p:cNvPr>
-          <p:cNvSpPr/>
-          <p:nvPr/>
-        </p:nvSpPr>
-        <p:spPr>
-          <a:xfrm>
-            <a:off x="7114945" y="1772774"/>
-            <a:ext cx="1948070" cy="768035"/>
-          </a:xfrm>
-          <a:prstGeom prst="rightArrow">
-            <a:avLst/>
-          </a:prstGeom>
-        </p:spPr>
-        <p:style>
-          <a:lnRef idx="2">
-            <a:schemeClr val="accent1">
-              <a:shade val="50000"/>
-            </a:schemeClr>
-          </a:lnRef>
-          <a:fillRef idx="1">
-            <a:schemeClr val="accent1"/>
-          </a:fillRef>
-          <a:effectRef idx="0">
-            <a:schemeClr val="accent1"/>
-          </a:effectRef>
-          <a:fontRef idx="minor">
-            <a:schemeClr val="lt1"/>
-          </a:fontRef>
-        </p:style>
-        <p:txBody>
-          <a:bodyPr rtlCol="0" anchor="ctr"/>
-          <a:lstStyle/>
           <a:p>
-            <a:pPr algn="ctr"/>
             <a:r>
               <a:rPr lang="en-US" dirty="0"/>
-              <a:t>Remainder = 0</a:t>
+              <a:t>	(A</a:t>
+            </a:r>
+            <a:r>
+              <a:rPr lang="en-US" baseline="-25000" dirty="0"/>
+              <a:t>1</a:t>
+            </a:r>
+            <a:r>
+              <a:rPr lang="en-US" dirty="0"/>
+              <a:t>X</a:t>
+            </a:r>
+            <a:r>
+              <a:rPr lang="en-US" baseline="30000" dirty="0"/>
+              <a:t>n</a:t>
+            </a:r>
+            <a:r>
+              <a:rPr lang="en-US" dirty="0"/>
+              <a:t>+A</a:t>
+            </a:r>
+            <a:r>
+              <a:rPr lang="en-US" baseline="-25000" dirty="0"/>
+              <a:t>2</a:t>
+            </a:r>
+            <a:r>
+              <a:rPr lang="en-US" dirty="0"/>
+              <a:t>X</a:t>
+            </a:r>
+            <a:r>
+              <a:rPr lang="en-US" baseline="30000" dirty="0"/>
+              <a:t>n-1</a:t>
+            </a:r>
+            <a:r>
+              <a:rPr lang="en-US" dirty="0"/>
+              <a:t>+……..+A</a:t>
+            </a:r>
+            <a:r>
+              <a:rPr lang="en-US" baseline="-25000" dirty="0"/>
+              <a:t>n-1</a:t>
+            </a:r>
+            <a:r>
+              <a:rPr lang="en-US" dirty="0"/>
+              <a:t>X + A</a:t>
+            </a:r>
+            <a:r>
+              <a:rPr lang="en-US" baseline="-25000" dirty="0"/>
+              <a:t>n </a:t>
+            </a:r>
+            <a:r>
+              <a:rPr lang="en-US" dirty="0"/>
+              <a:t>)  /  (aX</a:t>
+            </a:r>
+            <a:r>
+              <a:rPr lang="en-US" baseline="30000" dirty="0"/>
+              <a:t>2</a:t>
+            </a:r>
+            <a:r>
+              <a:rPr lang="en-US" dirty="0"/>
+              <a:t>+bX+c)</a:t>
             </a:r>
           </a:p>
         </p:txBody>
@@ -35136,52 +33729,6 @@
       </p:sp>
       <p:sp>
         <p:nvSpPr>
-          <p:cNvPr id="13" name="Arrow: Down 12">
-            <a:extLst>
-              <a:ext uri="{FF2B5EF4-FFF2-40B4-BE49-F238E27FC236}">
-                <a16:creationId xmlns:a16="http://schemas.microsoft.com/office/drawing/2014/main" id="{CFE3496C-9774-AD75-7D58-8840F5674703}"/>
-              </a:ext>
-            </a:extLst>
-          </p:cNvPr>
-          <p:cNvSpPr/>
-          <p:nvPr/>
-        </p:nvSpPr>
-        <p:spPr>
-          <a:xfrm>
-            <a:off x="10478403" y="2648653"/>
-            <a:ext cx="755374" cy="1090726"/>
-          </a:xfrm>
-          <a:prstGeom prst="downArrow">
-            <a:avLst/>
-          </a:prstGeom>
-        </p:spPr>
-        <p:style>
-          <a:lnRef idx="2">
-            <a:schemeClr val="accent1">
-              <a:shade val="50000"/>
-            </a:schemeClr>
-          </a:lnRef>
-          <a:fillRef idx="1">
-            <a:schemeClr val="accent1"/>
-          </a:fillRef>
-          <a:effectRef idx="0">
-            <a:schemeClr val="accent1"/>
-          </a:effectRef>
-          <a:fontRef idx="minor">
-            <a:schemeClr val="lt1"/>
-          </a:fontRef>
-        </p:style>
-        <p:txBody>
-          <a:bodyPr rtlCol="0" anchor="ctr"/>
-          <a:lstStyle/>
-          <a:p>
-            <a:pPr algn="ctr"/>
-            <a:endParaRPr lang="en-US"/>
-          </a:p>
-        </p:txBody>
-      </p:sp>
-      <p:sp>
-        <p:nvSpPr>
           <p:cNvPr id="14" name="Oval 13">
             <a:extLst>
               <a:ext uri="{FF2B5EF4-FFF2-40B4-BE49-F238E27FC236}">
@@ -35194,7 +33741,7 @@
         </p:nvSpPr>
         <p:spPr>
           <a:xfrm>
-            <a:off x="9431904" y="1720554"/>
+            <a:off x="9531627" y="3821720"/>
             <a:ext cx="2504661" cy="768035"/>
           </a:xfrm>
           <a:prstGeom prst="ellipse">
@@ -35203,18 +33750,16 @@
         </p:spPr>
         <p:style>
           <a:lnRef idx="2">
-            <a:schemeClr val="accent1">
-              <a:shade val="50000"/>
-            </a:schemeClr>
+            <a:schemeClr val="accent6"/>
           </a:lnRef>
           <a:fillRef idx="1">
-            <a:schemeClr val="accent1"/>
+            <a:schemeClr val="lt1"/>
           </a:fillRef>
           <a:effectRef idx="0">
-            <a:schemeClr val="accent1"/>
+            <a:schemeClr val="accent6"/>
           </a:effectRef>
           <a:fontRef idx="minor">
-            <a:schemeClr val="lt1"/>
+            <a:schemeClr val="dk1"/>
           </a:fontRef>
         </p:style>
         <p:txBody>
@@ -35224,13 +33769,21 @@
             <a:pPr algn="ctr"/>
             <a:r>
               <a:rPr lang="en-US" dirty="0"/>
-              <a:t>x^2 + mx + n</a:t>
+              <a:t>aX</a:t>
+            </a:r>
+            <a:r>
+              <a:rPr lang="en-US" baseline="30000" dirty="0"/>
+              <a:t>2</a:t>
+            </a:r>
+            <a:r>
+              <a:rPr lang="en-US" dirty="0"/>
+              <a:t>+bX+c</a:t>
             </a:r>
           </a:p>
         </p:txBody>
       </p:sp>
-      <mc:AlternateContent xmlns:mc="http://schemas.openxmlformats.org/markup-compatibility/2006" xmlns:a14="http://schemas.microsoft.com/office/drawing/2010/main">
-        <mc:Choice Requires="a14">
+      <mc:AlternateContent xmlns:mc="http://schemas.openxmlformats.org/markup-compatibility/2006">
+        <mc:Choice xmlns:a14="http://schemas.microsoft.com/office/drawing/2010/main" Requires="a14">
           <p:sp>
             <p:nvSpPr>
               <p:cNvPr id="15" name="Rectangle: Rounded Corners 14">
@@ -35245,7 +33798,7 @@
             </p:nvSpPr>
             <p:spPr>
               <a:xfrm>
-                <a:off x="9806609" y="3899443"/>
+                <a:off x="9709812" y="4832528"/>
                 <a:ext cx="2329402" cy="933085"/>
               </a:xfrm>
               <a:prstGeom prst="roundRect">
@@ -35254,18 +33807,16 @@
             </p:spPr>
             <p:style>
               <a:lnRef idx="2">
-                <a:schemeClr val="accent1">
-                  <a:shade val="50000"/>
-                </a:schemeClr>
+                <a:schemeClr val="accent6"/>
               </a:lnRef>
               <a:fillRef idx="1">
-                <a:schemeClr val="accent1"/>
+                <a:schemeClr val="lt1"/>
               </a:fillRef>
               <a:effectRef idx="0">
-                <a:schemeClr val="accent1"/>
+                <a:schemeClr val="accent6"/>
               </a:effectRef>
               <a:fontRef idx="minor">
-                <a:schemeClr val="lt1"/>
+                <a:schemeClr val="dk1"/>
               </a:fontRef>
             </p:style>
             <p:txBody>
@@ -35392,7 +33943,7 @@
             </p:txBody>
           </p:sp>
         </mc:Choice>
-        <mc:Fallback xmlns="">
+        <mc:Fallback>
           <p:sp>
             <p:nvSpPr>
               <p:cNvPr id="15" name="Rectangle: Rounded Corners 14">
@@ -35409,7 +33960,7 @@
             </p:nvSpPr>
             <p:spPr>
               <a:xfrm>
-                <a:off x="9806609" y="3899443"/>
+                <a:off x="9709812" y="4832528"/>
                 <a:ext cx="2329402" cy="933085"/>
               </a:xfrm>
               <a:prstGeom prst="roundRect">
@@ -35451,8 +34002,8 @@
         </p:nvSpPr>
         <p:spPr>
           <a:xfrm>
-            <a:off x="10593623" y="4992592"/>
-            <a:ext cx="755374" cy="578475"/>
+            <a:off x="10496826" y="5811619"/>
+            <a:ext cx="755374" cy="316984"/>
           </a:xfrm>
           <a:prstGeom prst="downArrow">
             <a:avLst/>
@@ -35460,18 +34011,16 @@
         </p:spPr>
         <p:style>
           <a:lnRef idx="2">
-            <a:schemeClr val="accent1">
-              <a:shade val="50000"/>
-            </a:schemeClr>
+            <a:schemeClr val="accent6"/>
           </a:lnRef>
           <a:fillRef idx="1">
-            <a:schemeClr val="accent1"/>
+            <a:schemeClr val="lt1"/>
           </a:fillRef>
           <a:effectRef idx="0">
-            <a:schemeClr val="accent1"/>
+            <a:schemeClr val="accent6"/>
           </a:effectRef>
           <a:fontRef idx="minor">
-            <a:schemeClr val="lt1"/>
+            <a:schemeClr val="dk1"/>
           </a:fontRef>
         </p:style>
         <p:txBody>
@@ -35497,7 +34046,7 @@
         </p:nvSpPr>
         <p:spPr>
           <a:xfrm>
-            <a:off x="9906332" y="5731131"/>
+            <a:off x="9906332" y="6135236"/>
             <a:ext cx="2129956" cy="668867"/>
           </a:xfrm>
           <a:prstGeom prst="ellipse">
@@ -35506,18 +34055,16 @@
         </p:spPr>
         <p:style>
           <a:lnRef idx="2">
-            <a:schemeClr val="accent1">
-              <a:shade val="50000"/>
-            </a:schemeClr>
+            <a:schemeClr val="accent6"/>
           </a:lnRef>
           <a:fillRef idx="1">
-            <a:schemeClr val="accent1"/>
+            <a:schemeClr val="lt1"/>
           </a:fillRef>
           <a:effectRef idx="0">
-            <a:schemeClr val="accent1"/>
+            <a:schemeClr val="accent6"/>
           </a:effectRef>
           <a:fontRef idx="minor">
-            <a:schemeClr val="lt1"/>
+            <a:schemeClr val="dk1"/>
           </a:fontRef>
         </p:style>
         <p:txBody>
@@ -35528,55 +34075,6 @@
             <a:r>
               <a:rPr lang="en-US" dirty="0"/>
               <a:t>Two roots</a:t>
-            </a:r>
-          </a:p>
-        </p:txBody>
-      </p:sp>
-      <p:sp>
-        <p:nvSpPr>
-          <p:cNvPr id="18" name="Arrow: Down 17">
-            <a:extLst>
-              <a:ext uri="{FF2B5EF4-FFF2-40B4-BE49-F238E27FC236}">
-                <a16:creationId xmlns:a16="http://schemas.microsoft.com/office/drawing/2014/main" id="{29F37147-7E71-D190-E834-85C39A3D307C}"/>
-              </a:ext>
-            </a:extLst>
-          </p:cNvPr>
-          <p:cNvSpPr/>
-          <p:nvPr/>
-        </p:nvSpPr>
-        <p:spPr>
-          <a:xfrm>
-            <a:off x="6947784" y="2565196"/>
-            <a:ext cx="626533" cy="1981728"/>
-          </a:xfrm>
-          <a:prstGeom prst="downArrow">
-            <a:avLst/>
-          </a:prstGeom>
-        </p:spPr>
-        <p:style>
-          <a:lnRef idx="2">
-            <a:schemeClr val="accent1">
-              <a:shade val="50000"/>
-            </a:schemeClr>
-          </a:lnRef>
-          <a:fillRef idx="1">
-            <a:schemeClr val="accent1"/>
-          </a:fillRef>
-          <a:effectRef idx="0">
-            <a:schemeClr val="accent1"/>
-          </a:effectRef>
-          <a:fontRef idx="minor">
-            <a:schemeClr val="lt1"/>
-          </a:fontRef>
-        </p:style>
-        <p:txBody>
-          <a:bodyPr rtlCol="0" anchor="ctr"/>
-          <a:lstStyle/>
-          <a:p>
-            <a:pPr algn="ctr"/>
-            <a:r>
-              <a:rPr lang="en-US" dirty="0"/>
-              <a:t>Quotient</a:t>
             </a:r>
           </a:p>
         </p:txBody>
@@ -35595,7 +34093,7 @@
         </p:nvSpPr>
         <p:spPr>
           <a:xfrm>
-            <a:off x="2590800" y="4832528"/>
+            <a:off x="2563283" y="5713377"/>
             <a:ext cx="6976533" cy="1090726"/>
           </a:xfrm>
           <a:prstGeom prst="ellipse">
@@ -35604,18 +34102,16 @@
         </p:spPr>
         <p:style>
           <a:lnRef idx="2">
-            <a:schemeClr val="accent1">
-              <a:shade val="50000"/>
-            </a:schemeClr>
+            <a:schemeClr val="accent6"/>
           </a:lnRef>
           <a:fillRef idx="1">
-            <a:schemeClr val="accent1"/>
+            <a:schemeClr val="lt1"/>
           </a:fillRef>
           <a:effectRef idx="0">
-            <a:schemeClr val="accent1"/>
+            <a:schemeClr val="accent6"/>
           </a:effectRef>
           <a:fontRef idx="minor">
-            <a:schemeClr val="lt1"/>
+            <a:schemeClr val="dk1"/>
           </a:fontRef>
         </p:style>
         <p:txBody>
@@ -35625,17 +34121,62 @@
             <a:pPr algn="ctr"/>
             <a:r>
               <a:rPr lang="en-US" dirty="0"/>
-              <a:t>b1(x)^n-2 + b2(x)^n-3 +…………..+b(n-1)x + b</a:t>
+              <a:t>A</a:t>
             </a:r>
+            <a:r>
+              <a:rPr lang="en-US" baseline="-25000" dirty="0"/>
+              <a:t>1</a:t>
+            </a:r>
+            <a:r>
+              <a:rPr lang="en-US" dirty="0"/>
+              <a:t>X</a:t>
+            </a:r>
+            <a:r>
+              <a:rPr lang="en-US" baseline="30000" dirty="0"/>
+              <a:t>n-2</a:t>
+            </a:r>
+            <a:r>
+              <a:rPr lang="en-US" dirty="0"/>
+              <a:t>+A</a:t>
+            </a:r>
+            <a:r>
+              <a:rPr lang="en-US" baseline="-25000" dirty="0"/>
+              <a:t>2</a:t>
+            </a:r>
+            <a:r>
+              <a:rPr lang="en-US" dirty="0"/>
+              <a:t>X</a:t>
+            </a:r>
+            <a:r>
+              <a:rPr lang="en-US" baseline="30000" dirty="0"/>
+              <a:t>n-3</a:t>
+            </a:r>
+            <a:r>
+              <a:rPr lang="en-US" dirty="0"/>
+              <a:t>+……..+A</a:t>
+            </a:r>
+            <a:r>
+              <a:rPr lang="en-US" baseline="-25000" dirty="0"/>
+              <a:t>n-3</a:t>
+            </a:r>
+            <a:r>
+              <a:rPr lang="en-US" dirty="0"/>
+              <a:t>X + A</a:t>
+            </a:r>
+            <a:r>
+              <a:rPr lang="en-US" baseline="-25000" dirty="0"/>
+              <a:t>n-2</a:t>
+            </a:r>
+            <a:endParaRPr lang="en-US" dirty="0"/>
           </a:p>
         </p:txBody>
       </p:sp>
       <p:sp>
         <p:nvSpPr>
-          <p:cNvPr id="32" name="Arrow: Up 31">
+          <p:cNvPr id="4" name="Oval 3">
             <a:extLst>
               <a:ext uri="{FF2B5EF4-FFF2-40B4-BE49-F238E27FC236}">
-                <a16:creationId xmlns:a16="http://schemas.microsoft.com/office/drawing/2014/main" id="{DD81092F-C1EB-A32E-B7EB-F779D4C12AB7}"/>
+                <a16:creationId xmlns:a16="http://schemas.microsoft.com/office/drawing/2014/main" id="{DD2CFDCE-653B-7443-CD92-AC143F4A6FDE}"/>
               </a:ext>
             </a:extLst>
           </p:cNvPr>
@@ -35644,8 +34185,383 @@
         </p:nvSpPr>
         <p:spPr>
           <a:xfrm>
-            <a:off x="2799852" y="3429000"/>
-            <a:ext cx="801757" cy="1403528"/>
+            <a:off x="3177633" y="1076261"/>
+            <a:ext cx="5062568" cy="914400"/>
+          </a:xfrm>
+          <a:prstGeom prst="ellipse">
+            <a:avLst/>
+          </a:prstGeom>
+        </p:spPr>
+        <p:style>
+          <a:lnRef idx="2">
+            <a:schemeClr val="accent6"/>
+          </a:lnRef>
+          <a:fillRef idx="1">
+            <a:schemeClr val="lt1"/>
+          </a:fillRef>
+          <a:effectRef idx="0">
+            <a:schemeClr val="accent6"/>
+          </a:effectRef>
+          <a:fontRef idx="minor">
+            <a:schemeClr val="dk1"/>
+          </a:fontRef>
+        </p:style>
+        <p:txBody>
+          <a:bodyPr rtlCol="0" anchor="ctr"/>
+          <a:lstStyle/>
+          <a:p>
+            <a:pPr algn="ctr"/>
+            <a:r>
+              <a:rPr lang="en-US" dirty="0"/>
+              <a:t>Input Equation</a:t>
+            </a:r>
+          </a:p>
+          <a:p>
+            <a:pPr algn="ctr"/>
+            <a:r>
+              <a:rPr lang="en-US" dirty="0"/>
+              <a:t>A</a:t>
+            </a:r>
+            <a:r>
+              <a:rPr lang="en-US" baseline="-25000" dirty="0"/>
+              <a:t>1</a:t>
+            </a:r>
+            <a:r>
+              <a:rPr lang="en-US" dirty="0"/>
+              <a:t>X</a:t>
+            </a:r>
+            <a:r>
+              <a:rPr lang="en-US" baseline="30000" dirty="0"/>
+              <a:t>n</a:t>
+            </a:r>
+            <a:r>
+              <a:rPr lang="en-US" dirty="0"/>
+              <a:t>+A</a:t>
+            </a:r>
+            <a:r>
+              <a:rPr lang="en-US" baseline="-25000" dirty="0"/>
+              <a:t>2</a:t>
+            </a:r>
+            <a:r>
+              <a:rPr lang="en-US" dirty="0"/>
+              <a:t>X</a:t>
+            </a:r>
+            <a:r>
+              <a:rPr lang="en-US" baseline="30000" dirty="0"/>
+              <a:t>n-1</a:t>
+            </a:r>
+            <a:r>
+              <a:rPr lang="en-US" dirty="0"/>
+              <a:t>+……..+A</a:t>
+            </a:r>
+            <a:r>
+              <a:rPr lang="en-US" baseline="-25000" dirty="0"/>
+              <a:t>n-1</a:t>
+            </a:r>
+            <a:r>
+              <a:rPr lang="en-US" dirty="0"/>
+              <a:t>X + A</a:t>
+            </a:r>
+            <a:r>
+              <a:rPr lang="en-US" baseline="-25000" dirty="0"/>
+              <a:t>n</a:t>
+            </a:r>
+            <a:endParaRPr lang="en-US" dirty="0"/>
+          </a:p>
+        </p:txBody>
+      </p:sp>
+      <p:sp>
+        <p:nvSpPr>
+          <p:cNvPr id="5" name="Diamond 4">
+            <a:extLst>
+              <a:ext uri="{FF2B5EF4-FFF2-40B4-BE49-F238E27FC236}">
+                <a16:creationId xmlns:a16="http://schemas.microsoft.com/office/drawing/2014/main" id="{A13A3D89-B000-4DBC-734A-E5285F9727FC}"/>
+              </a:ext>
+            </a:extLst>
+          </p:cNvPr>
+          <p:cNvSpPr/>
+          <p:nvPr/>
+        </p:nvSpPr>
+        <p:spPr>
+          <a:xfrm>
+            <a:off x="4147785" y="3821720"/>
+            <a:ext cx="3149333" cy="1010808"/>
+          </a:xfrm>
+          <a:prstGeom prst="diamond">
+            <a:avLst/>
+          </a:prstGeom>
+        </p:spPr>
+        <p:style>
+          <a:lnRef idx="2">
+            <a:schemeClr val="accent6"/>
+          </a:lnRef>
+          <a:fillRef idx="1">
+            <a:schemeClr val="lt1"/>
+          </a:fillRef>
+          <a:effectRef idx="0">
+            <a:schemeClr val="accent6"/>
+          </a:effectRef>
+          <a:fontRef idx="minor">
+            <a:schemeClr val="dk1"/>
+          </a:fontRef>
+        </p:style>
+        <p:txBody>
+          <a:bodyPr rtlCol="0" anchor="ctr"/>
+          <a:lstStyle/>
+          <a:p>
+            <a:pPr algn="ctr"/>
+            <a:r>
+              <a:rPr lang="en-US" dirty="0"/>
+              <a:t>Remainder=0</a:t>
+            </a:r>
+          </a:p>
+        </p:txBody>
+      </p:sp>
+      <p:sp>
+        <p:nvSpPr>
+          <p:cNvPr id="6" name="Arrow: Down 5">
+            <a:extLst>
+              <a:ext uri="{FF2B5EF4-FFF2-40B4-BE49-F238E27FC236}">
+                <a16:creationId xmlns:a16="http://schemas.microsoft.com/office/drawing/2014/main" id="{711BCFB4-DC82-281A-EAF0-0C4ECB54C26B}"/>
+              </a:ext>
+            </a:extLst>
+          </p:cNvPr>
+          <p:cNvSpPr/>
+          <p:nvPr/>
+        </p:nvSpPr>
+        <p:spPr>
+          <a:xfrm>
+            <a:off x="5470071" y="2104932"/>
+            <a:ext cx="326572" cy="240388"/>
+          </a:xfrm>
+          <a:prstGeom prst="downArrow">
+            <a:avLst/>
+          </a:prstGeom>
+        </p:spPr>
+        <p:style>
+          <a:lnRef idx="2">
+            <a:schemeClr val="accent6"/>
+          </a:lnRef>
+          <a:fillRef idx="1">
+            <a:schemeClr val="lt1"/>
+          </a:fillRef>
+          <a:effectRef idx="0">
+            <a:schemeClr val="accent6"/>
+          </a:effectRef>
+          <a:fontRef idx="minor">
+            <a:schemeClr val="dk1"/>
+          </a:fontRef>
+        </p:style>
+        <p:txBody>
+          <a:bodyPr rtlCol="0" anchor="ctr"/>
+          <a:lstStyle/>
+          <a:p>
+            <a:pPr algn="ctr"/>
+            <a:endParaRPr lang="en-US"/>
+          </a:p>
+        </p:txBody>
+      </p:sp>
+      <p:sp>
+        <p:nvSpPr>
+          <p:cNvPr id="7" name="Arrow: Down 6">
+            <a:extLst>
+              <a:ext uri="{FF2B5EF4-FFF2-40B4-BE49-F238E27FC236}">
+                <a16:creationId xmlns:a16="http://schemas.microsoft.com/office/drawing/2014/main" id="{0E479050-BC90-DDF0-739D-E5A3B434F5FD}"/>
+              </a:ext>
+            </a:extLst>
+          </p:cNvPr>
+          <p:cNvSpPr/>
+          <p:nvPr/>
+        </p:nvSpPr>
+        <p:spPr>
+          <a:xfrm>
+            <a:off x="10637749" y="4621948"/>
+            <a:ext cx="473528" cy="195478"/>
+          </a:xfrm>
+          <a:prstGeom prst="downArrow">
+            <a:avLst/>
+          </a:prstGeom>
+        </p:spPr>
+        <p:style>
+          <a:lnRef idx="2">
+            <a:schemeClr val="accent6"/>
+          </a:lnRef>
+          <a:fillRef idx="1">
+            <a:schemeClr val="lt1"/>
+          </a:fillRef>
+          <a:effectRef idx="0">
+            <a:schemeClr val="accent6"/>
+          </a:effectRef>
+          <a:fontRef idx="minor">
+            <a:schemeClr val="dk1"/>
+          </a:fontRef>
+        </p:style>
+        <p:txBody>
+          <a:bodyPr rtlCol="0" anchor="ctr"/>
+          <a:lstStyle/>
+          <a:p>
+            <a:pPr algn="ctr"/>
+            <a:endParaRPr lang="en-US"/>
+          </a:p>
+        </p:txBody>
+      </p:sp>
+      <p:sp>
+        <p:nvSpPr>
+          <p:cNvPr id="9" name="Arrow: Right 8">
+            <a:extLst>
+              <a:ext uri="{FF2B5EF4-FFF2-40B4-BE49-F238E27FC236}">
+                <a16:creationId xmlns:a16="http://schemas.microsoft.com/office/drawing/2014/main" id="{5F8DD144-7E43-D059-62CE-12D2CD9E46DA}"/>
+              </a:ext>
+            </a:extLst>
+          </p:cNvPr>
+          <p:cNvSpPr/>
+          <p:nvPr/>
+        </p:nvSpPr>
+        <p:spPr>
+          <a:xfrm>
+            <a:off x="7496493" y="4241409"/>
+            <a:ext cx="1835759" cy="348346"/>
+          </a:xfrm>
+          <a:prstGeom prst="rightArrow">
+            <a:avLst/>
+          </a:prstGeom>
+        </p:spPr>
+        <p:style>
+          <a:lnRef idx="2">
+            <a:schemeClr val="accent6"/>
+          </a:lnRef>
+          <a:fillRef idx="1">
+            <a:schemeClr val="lt1"/>
+          </a:fillRef>
+          <a:effectRef idx="0">
+            <a:schemeClr val="accent6"/>
+          </a:effectRef>
+          <a:fontRef idx="minor">
+            <a:schemeClr val="dk1"/>
+          </a:fontRef>
+        </p:style>
+        <p:txBody>
+          <a:bodyPr rtlCol="0" anchor="ctr"/>
+          <a:lstStyle/>
+          <a:p>
+            <a:pPr algn="ctr"/>
+            <a:r>
+              <a:rPr lang="en-US" dirty="0"/>
+              <a:t>yes</a:t>
+            </a:r>
+          </a:p>
+        </p:txBody>
+      </p:sp>
+      <p:sp>
+        <p:nvSpPr>
+          <p:cNvPr id="10" name="Arrow: Down 9">
+            <a:extLst>
+              <a:ext uri="{FF2B5EF4-FFF2-40B4-BE49-F238E27FC236}">
+                <a16:creationId xmlns:a16="http://schemas.microsoft.com/office/drawing/2014/main" id="{559280F4-F827-A370-687A-04E31B2276F5}"/>
+              </a:ext>
+            </a:extLst>
+          </p:cNvPr>
+          <p:cNvSpPr/>
+          <p:nvPr/>
+        </p:nvSpPr>
+        <p:spPr>
+          <a:xfrm>
+            <a:off x="7279201" y="4525932"/>
+            <a:ext cx="375891" cy="1125303"/>
+          </a:xfrm>
+          <a:prstGeom prst="downArrow">
+            <a:avLst/>
+          </a:prstGeom>
+        </p:spPr>
+        <p:style>
+          <a:lnRef idx="2">
+            <a:schemeClr val="accent6"/>
+          </a:lnRef>
+          <a:fillRef idx="1">
+            <a:schemeClr val="lt1"/>
+          </a:fillRef>
+          <a:effectRef idx="0">
+            <a:schemeClr val="accent6"/>
+          </a:effectRef>
+          <a:fontRef idx="minor">
+            <a:schemeClr val="dk1"/>
+          </a:fontRef>
+        </p:style>
+        <p:txBody>
+          <a:bodyPr rtlCol="0" anchor="ctr"/>
+          <a:lstStyle/>
+          <a:p>
+            <a:pPr algn="ctr"/>
+            <a:r>
+              <a:rPr lang="en-US" dirty="0"/>
+              <a:t>yes</a:t>
+            </a:r>
+          </a:p>
+        </p:txBody>
+      </p:sp>
+      <p:sp>
+        <p:nvSpPr>
+          <p:cNvPr id="20" name="Arrow: Left 19">
+            <a:extLst>
+              <a:ext uri="{FF2B5EF4-FFF2-40B4-BE49-F238E27FC236}">
+                <a16:creationId xmlns:a16="http://schemas.microsoft.com/office/drawing/2014/main" id="{7C71389E-2720-B35F-C924-22CF8E952880}"/>
+              </a:ext>
+            </a:extLst>
+          </p:cNvPr>
+          <p:cNvSpPr/>
+          <p:nvPr/>
+        </p:nvSpPr>
+        <p:spPr>
+          <a:xfrm>
+            <a:off x="2959436" y="4195808"/>
+            <a:ext cx="1026452" cy="330124"/>
+          </a:xfrm>
+          <a:prstGeom prst="leftArrow">
+            <a:avLst/>
+          </a:prstGeom>
+        </p:spPr>
+        <p:style>
+          <a:lnRef idx="2">
+            <a:schemeClr val="accent6"/>
+          </a:lnRef>
+          <a:fillRef idx="1">
+            <a:schemeClr val="lt1"/>
+          </a:fillRef>
+          <a:effectRef idx="0">
+            <a:schemeClr val="accent6"/>
+          </a:effectRef>
+          <a:fontRef idx="minor">
+            <a:schemeClr val="dk1"/>
+          </a:fontRef>
+        </p:style>
+        <p:txBody>
+          <a:bodyPr rtlCol="0" anchor="ctr"/>
+          <a:lstStyle/>
+          <a:p>
+            <a:pPr algn="ctr"/>
+            <a:r>
+              <a:rPr lang="en-US" dirty="0"/>
+              <a:t>No</a:t>
+            </a:r>
+          </a:p>
+        </p:txBody>
+      </p:sp>
+      <p:sp>
+        <p:nvSpPr>
+          <p:cNvPr id="21" name="Arrow: Up 20">
+            <a:extLst>
+              <a:ext uri="{FF2B5EF4-FFF2-40B4-BE49-F238E27FC236}">
+                <a16:creationId xmlns:a16="http://schemas.microsoft.com/office/drawing/2014/main" id="{E41B3331-2F67-70BB-6E63-E8EF5B2DA906}"/>
+              </a:ext>
+            </a:extLst>
+          </p:cNvPr>
+          <p:cNvSpPr/>
+          <p:nvPr/>
+        </p:nvSpPr>
+        <p:spPr>
+          <a:xfrm>
+            <a:off x="2685689" y="3790659"/>
+            <a:ext cx="348119" cy="535531"/>
           </a:xfrm>
           <a:prstGeom prst="upArrow">
             <a:avLst/>
@@ -35653,18 +34569,16 @@
         </p:spPr>
         <p:style>
           <a:lnRef idx="2">
-            <a:schemeClr val="accent1">
-              <a:shade val="50000"/>
-            </a:schemeClr>
+            <a:schemeClr val="accent6"/>
           </a:lnRef>
           <a:fillRef idx="1">
-            <a:schemeClr val="accent1"/>
+            <a:schemeClr val="lt1"/>
           </a:fillRef>
           <a:effectRef idx="0">
-            <a:schemeClr val="accent1"/>
+            <a:schemeClr val="accent6"/>
           </a:effectRef>
           <a:fontRef idx="minor">
-            <a:schemeClr val="lt1"/>
+            <a:schemeClr val="dk1"/>
           </a:fontRef>
         </p:style>
         <p:txBody>
@@ -35672,7 +34586,139 @@
           <a:lstStyle/>
           <a:p>
             <a:pPr algn="ctr"/>
-            <a:endParaRPr lang="en-US" dirty="0"/>
+            <a:endParaRPr lang="en-US"/>
+          </a:p>
+        </p:txBody>
+      </p:sp>
+      <p:sp>
+        <p:nvSpPr>
+          <p:cNvPr id="22" name="Arrow: Left 21">
+            <a:extLst>
+              <a:ext uri="{FF2B5EF4-FFF2-40B4-BE49-F238E27FC236}">
+                <a16:creationId xmlns:a16="http://schemas.microsoft.com/office/drawing/2014/main" id="{DF4429AD-66BA-50D5-D6E2-5C0BB737ED3D}"/>
+              </a:ext>
+            </a:extLst>
+          </p:cNvPr>
+          <p:cNvSpPr/>
+          <p:nvPr/>
+        </p:nvSpPr>
+        <p:spPr>
+          <a:xfrm>
+            <a:off x="881743" y="6128603"/>
+            <a:ext cx="1494535" cy="186472"/>
+          </a:xfrm>
+          <a:prstGeom prst="leftArrow">
+            <a:avLst/>
+          </a:prstGeom>
+        </p:spPr>
+        <p:style>
+          <a:lnRef idx="2">
+            <a:schemeClr val="accent6"/>
+          </a:lnRef>
+          <a:fillRef idx="1">
+            <a:schemeClr val="lt1"/>
+          </a:fillRef>
+          <a:effectRef idx="0">
+            <a:schemeClr val="accent6"/>
+          </a:effectRef>
+          <a:fontRef idx="minor">
+            <a:schemeClr val="dk1"/>
+          </a:fontRef>
+        </p:style>
+        <p:txBody>
+          <a:bodyPr rtlCol="0" anchor="ctr"/>
+          <a:lstStyle/>
+          <a:p>
+            <a:pPr algn="ctr"/>
+            <a:endParaRPr lang="en-US"/>
+          </a:p>
+        </p:txBody>
+      </p:sp>
+      <p:sp>
+        <p:nvSpPr>
+          <p:cNvPr id="24" name="Arrow: Right 23">
+            <a:extLst>
+              <a:ext uri="{FF2B5EF4-FFF2-40B4-BE49-F238E27FC236}">
+                <a16:creationId xmlns:a16="http://schemas.microsoft.com/office/drawing/2014/main" id="{246FE153-7103-7BB6-8AEA-C320FC5DE215}"/>
+              </a:ext>
+            </a:extLst>
+          </p:cNvPr>
+          <p:cNvSpPr/>
+          <p:nvPr/>
+        </p:nvSpPr>
+        <p:spPr>
+          <a:xfrm>
+            <a:off x="817892" y="3042239"/>
+            <a:ext cx="1378875" cy="186472"/>
+          </a:xfrm>
+          <a:prstGeom prst="rightArrow">
+            <a:avLst/>
+          </a:prstGeom>
+        </p:spPr>
+        <p:style>
+          <a:lnRef idx="2">
+            <a:schemeClr val="accent6"/>
+          </a:lnRef>
+          <a:fillRef idx="1">
+            <a:schemeClr val="lt1"/>
+          </a:fillRef>
+          <a:effectRef idx="0">
+            <a:schemeClr val="accent6"/>
+          </a:effectRef>
+          <a:fontRef idx="minor">
+            <a:schemeClr val="dk1"/>
+          </a:fontRef>
+        </p:style>
+        <p:txBody>
+          <a:bodyPr rtlCol="0" anchor="ctr"/>
+          <a:lstStyle/>
+          <a:p>
+            <a:pPr algn="ctr"/>
+            <a:endParaRPr lang="en-US"/>
+          </a:p>
+        </p:txBody>
+      </p:sp>
+      <p:sp>
+        <p:nvSpPr>
+          <p:cNvPr id="26" name="Arrow: Up 25">
+            <a:extLst>
+              <a:ext uri="{FF2B5EF4-FFF2-40B4-BE49-F238E27FC236}">
+                <a16:creationId xmlns:a16="http://schemas.microsoft.com/office/drawing/2014/main" id="{23F5FAA2-07BA-7A89-ED26-EB23CC046131}"/>
+              </a:ext>
+            </a:extLst>
+          </p:cNvPr>
+          <p:cNvSpPr/>
+          <p:nvPr/>
+        </p:nvSpPr>
+        <p:spPr>
+          <a:xfrm>
+            <a:off x="734008" y="3167251"/>
+            <a:ext cx="250774" cy="3091489"/>
+          </a:xfrm>
+          <a:prstGeom prst="upArrow">
+            <a:avLst/>
+          </a:prstGeom>
+        </p:spPr>
+        <p:style>
+          <a:lnRef idx="2">
+            <a:schemeClr val="accent6"/>
+          </a:lnRef>
+          <a:fillRef idx="1">
+            <a:schemeClr val="lt1"/>
+          </a:fillRef>
+          <a:effectRef idx="0">
+            <a:schemeClr val="accent6"/>
+          </a:effectRef>
+          <a:fontRef idx="minor">
+            <a:schemeClr val="dk1"/>
+          </a:fontRef>
+        </p:style>
+        <p:txBody>
+          <a:bodyPr rtlCol="0" anchor="ctr"/>
+          <a:lstStyle/>
+          <a:p>
+            <a:pPr algn="ctr"/>
+            <a:endParaRPr lang="en-US"/>
           </a:p>
         </p:txBody>
       </p:sp>
@@ -35760,7 +34806,7 @@
                             </p:stCondLst>
                             <p:childTnLst>
                               <p:par>
-                                <p:cTn id="10" presetID="42" presetClass="entr" presetSubtype="0" fill="hold" grpId="0" nodeType="clickEffect">
+                                <p:cTn id="10" presetID="2" presetClass="entr" presetSubtype="4" fill="hold" grpId="0" nodeType="clickEffect">
                                   <p:stCondLst>
                                     <p:cond delay="0"/>
                                   </p:stCondLst>
@@ -35768,6 +34814,170 @@
                                     <p:set>
                                       <p:cBhvr>
                                         <p:cTn id="11" dur="1" fill="hold">
+                                          <p:stCondLst>
+                                            <p:cond delay="0"/>
+                                          </p:stCondLst>
+                                        </p:cTn>
+                                        <p:tgtEl>
+                                          <p:spTgt spid="4"/>
+                                        </p:tgtEl>
+                                        <p:attrNameLst>
+                                          <p:attrName>style.visibility</p:attrName>
+                                        </p:attrNameLst>
+                                      </p:cBhvr>
+                                      <p:to>
+                                        <p:strVal val="visible"/>
+                                      </p:to>
+                                    </p:set>
+                                    <p:anim calcmode="lin" valueType="num">
+                                      <p:cBhvr additive="base">
+                                        <p:cTn id="12" dur="500" fill="hold"/>
+                                        <p:tgtEl>
+                                          <p:spTgt spid="4"/>
+                                        </p:tgtEl>
+                                        <p:attrNameLst>
+                                          <p:attrName>ppt_x</p:attrName>
+                                        </p:attrNameLst>
+                                      </p:cBhvr>
+                                      <p:tavLst>
+                                        <p:tav tm="0">
+                                          <p:val>
+                                            <p:strVal val="#ppt_x"/>
+                                          </p:val>
+                                        </p:tav>
+                                        <p:tav tm="100000">
+                                          <p:val>
+                                            <p:strVal val="#ppt_x"/>
+                                          </p:val>
+                                        </p:tav>
+                                      </p:tavLst>
+                                    </p:anim>
+                                    <p:anim calcmode="lin" valueType="num">
+                                      <p:cBhvr additive="base">
+                                        <p:cTn id="13" dur="500" fill="hold"/>
+                                        <p:tgtEl>
+                                          <p:spTgt spid="4"/>
+                                        </p:tgtEl>
+                                        <p:attrNameLst>
+                                          <p:attrName>ppt_y</p:attrName>
+                                        </p:attrNameLst>
+                                      </p:cBhvr>
+                                      <p:tavLst>
+                                        <p:tav tm="0">
+                                          <p:val>
+                                            <p:strVal val="1+#ppt_h/2"/>
+                                          </p:val>
+                                        </p:tav>
+                                        <p:tav tm="100000">
+                                          <p:val>
+                                            <p:strVal val="#ppt_y"/>
+                                          </p:val>
+                                        </p:tav>
+                                      </p:tavLst>
+                                    </p:anim>
+                                  </p:childTnLst>
+                                </p:cTn>
+                              </p:par>
+                            </p:childTnLst>
+                          </p:cTn>
+                        </p:par>
+                      </p:childTnLst>
+                    </p:cTn>
+                  </p:par>
+                  <p:par>
+                    <p:cTn id="14" fill="hold">
+                      <p:stCondLst>
+                        <p:cond delay="indefinite"/>
+                      </p:stCondLst>
+                      <p:childTnLst>
+                        <p:par>
+                          <p:cTn id="15" fill="hold">
+                            <p:stCondLst>
+                              <p:cond delay="0"/>
+                            </p:stCondLst>
+                            <p:childTnLst>
+                              <p:par>
+                                <p:cTn id="16" presetID="2" presetClass="entr" presetSubtype="4" fill="hold" grpId="0" nodeType="clickEffect">
+                                  <p:stCondLst>
+                                    <p:cond delay="0"/>
+                                  </p:stCondLst>
+                                  <p:childTnLst>
+                                    <p:set>
+                                      <p:cBhvr>
+                                        <p:cTn id="17" dur="1" fill="hold">
+                                          <p:stCondLst>
+                                            <p:cond delay="0"/>
+                                          </p:stCondLst>
+                                        </p:cTn>
+                                        <p:tgtEl>
+                                          <p:spTgt spid="6"/>
+                                        </p:tgtEl>
+                                        <p:attrNameLst>
+                                          <p:attrName>style.visibility</p:attrName>
+                                        </p:attrNameLst>
+                                      </p:cBhvr>
+                                      <p:to>
+                                        <p:strVal val="visible"/>
+                                      </p:to>
+                                    </p:set>
+                                    <p:anim calcmode="lin" valueType="num">
+                                      <p:cBhvr additive="base">
+                                        <p:cTn id="18" dur="500" fill="hold"/>
+                                        <p:tgtEl>
+                                          <p:spTgt spid="6"/>
+                                        </p:tgtEl>
+                                        <p:attrNameLst>
+                                          <p:attrName>ppt_x</p:attrName>
+                                        </p:attrNameLst>
+                                      </p:cBhvr>
+                                      <p:tavLst>
+                                        <p:tav tm="0">
+                                          <p:val>
+                                            <p:strVal val="#ppt_x"/>
+                                          </p:val>
+                                        </p:tav>
+                                        <p:tav tm="100000">
+                                          <p:val>
+                                            <p:strVal val="#ppt_x"/>
+                                          </p:val>
+                                        </p:tav>
+                                      </p:tavLst>
+                                    </p:anim>
+                                    <p:anim calcmode="lin" valueType="num">
+                                      <p:cBhvr additive="base">
+                                        <p:cTn id="19" dur="500" fill="hold"/>
+                                        <p:tgtEl>
+                                          <p:spTgt spid="6"/>
+                                        </p:tgtEl>
+                                        <p:attrNameLst>
+                                          <p:attrName>ppt_y</p:attrName>
+                                        </p:attrNameLst>
+                                      </p:cBhvr>
+                                      <p:tavLst>
+                                        <p:tav tm="0">
+                                          <p:val>
+                                            <p:strVal val="1+#ppt_h/2"/>
+                                          </p:val>
+                                        </p:tav>
+                                        <p:tav tm="100000">
+                                          <p:val>
+                                            <p:strVal val="#ppt_y"/>
+                                          </p:val>
+                                        </p:tav>
+                                      </p:tavLst>
+                                    </p:anim>
+                                  </p:childTnLst>
+                                </p:cTn>
+                              </p:par>
+                              <p:par>
+                                <p:cTn id="20" presetID="2" presetClass="entr" presetSubtype="4" fill="hold" grpId="0" nodeType="withEffect">
+                                  <p:stCondLst>
+                                    <p:cond delay="0"/>
+                                  </p:stCondLst>
+                                  <p:childTnLst>
+                                    <p:set>
+                                      <p:cBhvr>
+                                        <p:cTn id="21" dur="1" fill="hold">
                                           <p:stCondLst>
                                             <p:cond delay="0"/>
                                           </p:stCondLst>
@@ -35783,17 +34993,9 @@
                                         <p:strVal val="visible"/>
                                       </p:to>
                                     </p:set>
-                                    <p:animEffect transition="in" filter="fade">
-                                      <p:cBhvr>
-                                        <p:cTn id="12" dur="1000"/>
-                                        <p:tgtEl>
-                                          <p:spTgt spid="8"/>
-                                        </p:tgtEl>
-                                      </p:cBhvr>
-                                    </p:animEffect>
                                     <p:anim calcmode="lin" valueType="num">
-                                      <p:cBhvr>
-                                        <p:cTn id="13" dur="1000" fill="hold"/>
+                                      <p:cBhvr additive="base">
+                                        <p:cTn id="22" dur="500" fill="hold"/>
                                         <p:tgtEl>
                                           <p:spTgt spid="8"/>
                                         </p:tgtEl>
@@ -35815,8 +35017,8 @@
                                       </p:tavLst>
                                     </p:anim>
                                     <p:anim calcmode="lin" valueType="num">
-                                      <p:cBhvr>
-                                        <p:cTn id="14" dur="1000" fill="hold"/>
+                                      <p:cBhvr additive="base">
+                                        <p:cTn id="23" dur="500" fill="hold"/>
                                         <p:tgtEl>
                                           <p:spTgt spid="8"/>
                                         </p:tgtEl>
@@ -35827,7 +35029,7 @@
                                       <p:tavLst>
                                         <p:tav tm="0">
                                           <p:val>
-                                            <p:strVal val="#ppt_y+.1"/>
+                                            <p:strVal val="1+#ppt_h/2"/>
                                           </p:val>
                                         </p:tav>
                                         <p:tav tm="100000">
@@ -35847,32 +35049,32 @@
                     </p:cTn>
                   </p:par>
                   <p:par>
-                    <p:cTn id="15" fill="hold">
+                    <p:cTn id="24" fill="hold">
                       <p:stCondLst>
                         <p:cond delay="indefinite"/>
                       </p:stCondLst>
                       <p:childTnLst>
                         <p:par>
-                          <p:cTn id="16" fill="hold">
+                          <p:cTn id="25" fill="hold">
                             <p:stCondLst>
                               <p:cond delay="0"/>
                             </p:stCondLst>
                             <p:childTnLst>
                               <p:par>
-                                <p:cTn id="17" presetID="16" presetClass="entr" presetSubtype="21" fill="hold" grpId="0" nodeType="clickEffect">
+                                <p:cTn id="26" presetID="2" presetClass="entr" presetSubtype="4" fill="hold" grpId="0" nodeType="clickEffect">
                                   <p:stCondLst>
                                     <p:cond delay="0"/>
                                   </p:stCondLst>
                                   <p:childTnLst>
                                     <p:set>
                                       <p:cBhvr>
-                                        <p:cTn id="18" dur="1" fill="hold">
+                                        <p:cTn id="27" dur="1" fill="hold">
                                           <p:stCondLst>
                                             <p:cond delay="0"/>
                                           </p:stCondLst>
                                         </p:cTn>
                                         <p:tgtEl>
-                                          <p:spTgt spid="11"/>
+                                          <p:spTgt spid="5"/>
                                         </p:tgtEl>
                                         <p:attrNameLst>
                                           <p:attrName>style.visibility</p:attrName>
@@ -35882,26 +35084,228 @@
                                         <p:strVal val="visible"/>
                                       </p:to>
                                     </p:set>
-                                    <p:animEffect transition="in" filter="barn(inVertical)">
-                                      <p:cBhvr>
-                                        <p:cTn id="19" dur="500"/>
+                                    <p:anim calcmode="lin" valueType="num">
+                                      <p:cBhvr additive="base">
+                                        <p:cTn id="28" dur="500" fill="hold"/>
                                         <p:tgtEl>
-                                          <p:spTgt spid="11"/>
+                                          <p:spTgt spid="5"/>
                                         </p:tgtEl>
+                                        <p:attrNameLst>
+                                          <p:attrName>ppt_x</p:attrName>
+                                        </p:attrNameLst>
                                       </p:cBhvr>
-                                    </p:animEffect>
+                                      <p:tavLst>
+                                        <p:tav tm="0">
+                                          <p:val>
+                                            <p:strVal val="#ppt_x"/>
+                                          </p:val>
+                                        </p:tav>
+                                        <p:tav tm="100000">
+                                          <p:val>
+                                            <p:strVal val="#ppt_x"/>
+                                          </p:val>
+                                        </p:tav>
+                                      </p:tavLst>
+                                    </p:anim>
+                                    <p:anim calcmode="lin" valueType="num">
+                                      <p:cBhvr additive="base">
+                                        <p:cTn id="29" dur="500" fill="hold"/>
+                                        <p:tgtEl>
+                                          <p:spTgt spid="5"/>
+                                        </p:tgtEl>
+                                        <p:attrNameLst>
+                                          <p:attrName>ppt_y</p:attrName>
+                                        </p:attrNameLst>
+                                      </p:cBhvr>
+                                      <p:tavLst>
+                                        <p:tav tm="0">
+                                          <p:val>
+                                            <p:strVal val="1+#ppt_h/2"/>
+                                          </p:val>
+                                        </p:tav>
+                                        <p:tav tm="100000">
+                                          <p:val>
+                                            <p:strVal val="#ppt_y"/>
+                                          </p:val>
+                                        </p:tav>
+                                      </p:tavLst>
+                                    </p:anim>
                                   </p:childTnLst>
                                 </p:cTn>
                               </p:par>
                               <p:par>
-                                <p:cTn id="20" presetID="16" presetClass="entr" presetSubtype="21" fill="hold" grpId="0" nodeType="withEffect">
+                                <p:cTn id="30" presetID="2" presetClass="entr" presetSubtype="4" fill="hold" grpId="0" nodeType="withEffect">
                                   <p:stCondLst>
                                     <p:cond delay="0"/>
                                   </p:stCondLst>
                                   <p:childTnLst>
                                     <p:set>
                                       <p:cBhvr>
-                                        <p:cTn id="21" dur="1" fill="hold">
+                                        <p:cTn id="31" dur="1" fill="hold">
+                                          <p:stCondLst>
+                                            <p:cond delay="0"/>
+                                          </p:stCondLst>
+                                        </p:cTn>
+                                        <p:tgtEl>
+                                          <p:spTgt spid="20"/>
+                                        </p:tgtEl>
+                                        <p:attrNameLst>
+                                          <p:attrName>style.visibility</p:attrName>
+                                        </p:attrNameLst>
+                                      </p:cBhvr>
+                                      <p:to>
+                                        <p:strVal val="visible"/>
+                                      </p:to>
+                                    </p:set>
+                                    <p:anim calcmode="lin" valueType="num">
+                                      <p:cBhvr additive="base">
+                                        <p:cTn id="32" dur="500" fill="hold"/>
+                                        <p:tgtEl>
+                                          <p:spTgt spid="20"/>
+                                        </p:tgtEl>
+                                        <p:attrNameLst>
+                                          <p:attrName>ppt_x</p:attrName>
+                                        </p:attrNameLst>
+                                      </p:cBhvr>
+                                      <p:tavLst>
+                                        <p:tav tm="0">
+                                          <p:val>
+                                            <p:strVal val="#ppt_x"/>
+                                          </p:val>
+                                        </p:tav>
+                                        <p:tav tm="100000">
+                                          <p:val>
+                                            <p:strVal val="#ppt_x"/>
+                                          </p:val>
+                                        </p:tav>
+                                      </p:tavLst>
+                                    </p:anim>
+                                    <p:anim calcmode="lin" valueType="num">
+                                      <p:cBhvr additive="base">
+                                        <p:cTn id="33" dur="500" fill="hold"/>
+                                        <p:tgtEl>
+                                          <p:spTgt spid="20"/>
+                                        </p:tgtEl>
+                                        <p:attrNameLst>
+                                          <p:attrName>ppt_y</p:attrName>
+                                        </p:attrNameLst>
+                                      </p:cBhvr>
+                                      <p:tavLst>
+                                        <p:tav tm="0">
+                                          <p:val>
+                                            <p:strVal val="1+#ppt_h/2"/>
+                                          </p:val>
+                                        </p:tav>
+                                        <p:tav tm="100000">
+                                          <p:val>
+                                            <p:strVal val="#ppt_y"/>
+                                          </p:val>
+                                        </p:tav>
+                                      </p:tavLst>
+                                    </p:anim>
+                                  </p:childTnLst>
+                                </p:cTn>
+                              </p:par>
+                              <p:par>
+                                <p:cTn id="34" presetID="2" presetClass="entr" presetSubtype="4" fill="hold" grpId="0" nodeType="withEffect">
+                                  <p:stCondLst>
+                                    <p:cond delay="0"/>
+                                  </p:stCondLst>
+                                  <p:childTnLst>
+                                    <p:set>
+                                      <p:cBhvr>
+                                        <p:cTn id="35" dur="1" fill="hold">
+                                          <p:stCondLst>
+                                            <p:cond delay="0"/>
+                                          </p:stCondLst>
+                                        </p:cTn>
+                                        <p:tgtEl>
+                                          <p:spTgt spid="21"/>
+                                        </p:tgtEl>
+                                        <p:attrNameLst>
+                                          <p:attrName>style.visibility</p:attrName>
+                                        </p:attrNameLst>
+                                      </p:cBhvr>
+                                      <p:to>
+                                        <p:strVal val="visible"/>
+                                      </p:to>
+                                    </p:set>
+                                    <p:anim calcmode="lin" valueType="num">
+                                      <p:cBhvr additive="base">
+                                        <p:cTn id="36" dur="500" fill="hold"/>
+                                        <p:tgtEl>
+                                          <p:spTgt spid="21"/>
+                                        </p:tgtEl>
+                                        <p:attrNameLst>
+                                          <p:attrName>ppt_x</p:attrName>
+                                        </p:attrNameLst>
+                                      </p:cBhvr>
+                                      <p:tavLst>
+                                        <p:tav tm="0">
+                                          <p:val>
+                                            <p:strVal val="#ppt_x"/>
+                                          </p:val>
+                                        </p:tav>
+                                        <p:tav tm="100000">
+                                          <p:val>
+                                            <p:strVal val="#ppt_x"/>
+                                          </p:val>
+                                        </p:tav>
+                                      </p:tavLst>
+                                    </p:anim>
+                                    <p:anim calcmode="lin" valueType="num">
+                                      <p:cBhvr additive="base">
+                                        <p:cTn id="37" dur="500" fill="hold"/>
+                                        <p:tgtEl>
+                                          <p:spTgt spid="21"/>
+                                        </p:tgtEl>
+                                        <p:attrNameLst>
+                                          <p:attrName>ppt_y</p:attrName>
+                                        </p:attrNameLst>
+                                      </p:cBhvr>
+                                      <p:tavLst>
+                                        <p:tav tm="0">
+                                          <p:val>
+                                            <p:strVal val="1+#ppt_h/2"/>
+                                          </p:val>
+                                        </p:tav>
+                                        <p:tav tm="100000">
+                                          <p:val>
+                                            <p:strVal val="#ppt_y"/>
+                                          </p:val>
+                                        </p:tav>
+                                      </p:tavLst>
+                                    </p:anim>
+                                  </p:childTnLst>
+                                </p:cTn>
+                              </p:par>
+                            </p:childTnLst>
+                          </p:cTn>
+                        </p:par>
+                      </p:childTnLst>
+                    </p:cTn>
+                  </p:par>
+                  <p:par>
+                    <p:cTn id="38" fill="hold">
+                      <p:stCondLst>
+                        <p:cond delay="indefinite"/>
+                      </p:stCondLst>
+                      <p:childTnLst>
+                        <p:par>
+                          <p:cTn id="39" fill="hold">
+                            <p:stCondLst>
+                              <p:cond delay="0"/>
+                            </p:stCondLst>
+                            <p:childTnLst>
+                              <p:par>
+                                <p:cTn id="40" presetID="2" presetClass="entr" presetSubtype="4" fill="hold" grpId="0" nodeType="clickEffect">
+                                  <p:stCondLst>
+                                    <p:cond delay="0"/>
+                                  </p:stCondLst>
+                                  <p:childTnLst>
+                                    <p:set>
+                                      <p:cBhvr>
+                                        <p:cTn id="41" dur="1" fill="hold">
                                           <p:stCondLst>
                                             <p:cond delay="0"/>
                                           </p:stCondLst>
@@ -35917,14 +35321,125 @@
                                         <p:strVal val="visible"/>
                                       </p:to>
                                     </p:set>
-                                    <p:animEffect transition="in" filter="barn(inVertical)">
-                                      <p:cBhvr>
-                                        <p:cTn id="22" dur="500"/>
+                                    <p:anim calcmode="lin" valueType="num">
+                                      <p:cBhvr additive="base">
+                                        <p:cTn id="42" dur="500" fill="hold"/>
                                         <p:tgtEl>
                                           <p:spTgt spid="14"/>
                                         </p:tgtEl>
+                                        <p:attrNameLst>
+                                          <p:attrName>ppt_x</p:attrName>
+                                        </p:attrNameLst>
                                       </p:cBhvr>
-                                    </p:animEffect>
+                                      <p:tavLst>
+                                        <p:tav tm="0">
+                                          <p:val>
+                                            <p:strVal val="#ppt_x"/>
+                                          </p:val>
+                                        </p:tav>
+                                        <p:tav tm="100000">
+                                          <p:val>
+                                            <p:strVal val="#ppt_x"/>
+                                          </p:val>
+                                        </p:tav>
+                                      </p:tavLst>
+                                    </p:anim>
+                                    <p:anim calcmode="lin" valueType="num">
+                                      <p:cBhvr additive="base">
+                                        <p:cTn id="43" dur="500" fill="hold"/>
+                                        <p:tgtEl>
+                                          <p:spTgt spid="14"/>
+                                        </p:tgtEl>
+                                        <p:attrNameLst>
+                                          <p:attrName>ppt_y</p:attrName>
+                                        </p:attrNameLst>
+                                      </p:cBhvr>
+                                      <p:tavLst>
+                                        <p:tav tm="0">
+                                          <p:val>
+                                            <p:strVal val="1+#ppt_h/2"/>
+                                          </p:val>
+                                        </p:tav>
+                                        <p:tav tm="100000">
+                                          <p:val>
+                                            <p:strVal val="#ppt_y"/>
+                                          </p:val>
+                                        </p:tav>
+                                      </p:tavLst>
+                                    </p:anim>
+                                  </p:childTnLst>
+                                </p:cTn>
+                              </p:par>
+                              <p:par>
+                                <p:cTn id="44" presetID="2" presetClass="entr" presetSubtype="4" fill="hold" grpId="0" nodeType="withEffect">
+                                  <p:stCondLst>
+                                    <p:cond delay="0"/>
+                                  </p:stCondLst>
+                                  <p:childTnLst>
+                                    <p:set>
+                                      <p:cBhvr>
+                                        <p:cTn id="45" dur="1" fill="hold">
+                                          <p:stCondLst>
+                                            <p:cond delay="0"/>
+                                          </p:stCondLst>
+                                        </p:cTn>
+                                        <p:tgtEl>
+                                          <p:spTgt spid="9"/>
+                                        </p:tgtEl>
+                                        <p:attrNameLst>
+                                          <p:attrName>style.visibility</p:attrName>
+                                        </p:attrNameLst>
+                                      </p:cBhvr>
+                                      <p:to>
+                                        <p:strVal val="visible"/>
+                                      </p:to>
+                                    </p:set>
+                                    <p:anim calcmode="lin" valueType="num">
+                                      <p:cBhvr additive="base">
+                                        <p:cTn id="46" dur="500" fill="hold"/>
+                                        <p:tgtEl>
+                                          <p:spTgt spid="9"/>
+                                        </p:tgtEl>
+                                        <p:attrNameLst>
+                                          <p:attrName>ppt_x</p:attrName>
+                                        </p:attrNameLst>
+                                      </p:cBhvr>
+                                      <p:tavLst>
+                                        <p:tav tm="0">
+                                          <p:val>
+                                            <p:strVal val="#ppt_x"/>
+                                          </p:val>
+                                        </p:tav>
+                                        <p:tav tm="100000">
+                                          <p:val>
+                                            <p:strVal val="#ppt_x"/>
+                                          </p:val>
+                                        </p:tav>
+                                      </p:tavLst>
+                                    </p:anim>
+                                    <p:anim calcmode="lin" valueType="num">
+                                      <p:cBhvr additive="base">
+                                        <p:cTn id="47" dur="500" fill="hold"/>
+                                        <p:tgtEl>
+                                          <p:spTgt spid="9"/>
+                                        </p:tgtEl>
+                                        <p:attrNameLst>
+                                          <p:attrName>ppt_y</p:attrName>
+                                        </p:attrNameLst>
+                                      </p:cBhvr>
+                                      <p:tavLst>
+                                        <p:tav tm="0">
+                                          <p:val>
+                                            <p:strVal val="1+#ppt_h/2"/>
+                                          </p:val>
+                                        </p:tav>
+                                        <p:tav tm="100000">
+                                          <p:val>
+                                            <p:strVal val="#ppt_y"/>
+                                          </p:val>
+                                        </p:tav>
+                                      </p:tavLst>
+                                    </p:anim>
                                   </p:childTnLst>
                                 </p:cTn>
                               </p:par>
@@ -35935,32 +35450,32 @@
                     </p:cTn>
                   </p:par>
                   <p:par>
-                    <p:cTn id="23" fill="hold">
+                    <p:cTn id="48" fill="hold">
                       <p:stCondLst>
                         <p:cond delay="indefinite"/>
                       </p:stCondLst>
                       <p:childTnLst>
                         <p:par>
-                          <p:cTn id="24" fill="hold">
+                          <p:cTn id="49" fill="hold">
                             <p:stCondLst>
                               <p:cond delay="0"/>
                             </p:stCondLst>
                             <p:childTnLst>
                               <p:par>
-                                <p:cTn id="25" presetID="16" presetClass="entr" presetSubtype="21" fill="hold" grpId="0" nodeType="clickEffect">
+                                <p:cTn id="50" presetID="2" presetClass="entr" presetSubtype="4" fill="hold" grpId="0" nodeType="clickEffect">
                                   <p:stCondLst>
                                     <p:cond delay="0"/>
                                   </p:stCondLst>
                                   <p:childTnLst>
                                     <p:set>
                                       <p:cBhvr>
-                                        <p:cTn id="26" dur="1" fill="hold">
+                                        <p:cTn id="51" dur="1" fill="hold">
                                           <p:stCondLst>
                                             <p:cond delay="0"/>
                                           </p:stCondLst>
                                         </p:cTn>
                                         <p:tgtEl>
-                                          <p:spTgt spid="13"/>
+                                          <p:spTgt spid="7"/>
                                         </p:tgtEl>
                                         <p:attrNameLst>
                                           <p:attrName>style.visibility</p:attrName>
@@ -35970,26 +35485,64 @@
                                         <p:strVal val="visible"/>
                                       </p:to>
                                     </p:set>
-                                    <p:animEffect transition="in" filter="barn(inVertical)">
-                                      <p:cBhvr>
-                                        <p:cTn id="27" dur="500"/>
+                                    <p:anim calcmode="lin" valueType="num">
+                                      <p:cBhvr additive="base">
+                                        <p:cTn id="52" dur="500" fill="hold"/>
                                         <p:tgtEl>
-                                          <p:spTgt spid="13"/>
+                                          <p:spTgt spid="7"/>
                                         </p:tgtEl>
+                                        <p:attrNameLst>
+                                          <p:attrName>ppt_x</p:attrName>
+                                        </p:attrNameLst>
                                       </p:cBhvr>
-                                    </p:animEffect>
+                                      <p:tavLst>
+                                        <p:tav tm="0">
+                                          <p:val>
+                                            <p:strVal val="#ppt_x"/>
+                                          </p:val>
+                                        </p:tav>
+                                        <p:tav tm="100000">
+                                          <p:val>
+                                            <p:strVal val="#ppt_x"/>
+                                          </p:val>
+                                        </p:tav>
+                                      </p:tavLst>
+                                    </p:anim>
+                                    <p:anim calcmode="lin" valueType="num">
+                                      <p:cBhvr additive="base">
+                                        <p:cTn id="53" dur="500" fill="hold"/>
+                                        <p:tgtEl>
+                                          <p:spTgt spid="7"/>
+                                        </p:tgtEl>
+                                        <p:attrNameLst>
+                                          <p:attrName>ppt_y</p:attrName>
+                                        </p:attrNameLst>
+                                      </p:cBhvr>
+                                      <p:tavLst>
+                                        <p:tav tm="0">
+                                          <p:val>
+                                            <p:strVal val="1+#ppt_h/2"/>
+                                          </p:val>
+                                        </p:tav>
+                                        <p:tav tm="100000">
+                                          <p:val>
+                                            <p:strVal val="#ppt_y"/>
+                                          </p:val>
+                                        </p:tav>
+                                      </p:tavLst>
+                                    </p:anim>
                                   </p:childTnLst>
                                 </p:cTn>
                               </p:par>
                               <p:par>
-                                <p:cTn id="28" presetID="16" presetClass="entr" presetSubtype="21" fill="hold" grpId="0" nodeType="withEffect">
+                                <p:cTn id="54" presetID="2" presetClass="entr" presetSubtype="4" fill="hold" grpId="0" nodeType="withEffect">
                                   <p:stCondLst>
                                     <p:cond delay="0"/>
                                   </p:stCondLst>
                                   <p:childTnLst>
                                     <p:set>
                                       <p:cBhvr>
-                                        <p:cTn id="29" dur="1" fill="hold">
+                                        <p:cTn id="55" dur="1" fill="hold">
                                           <p:stCondLst>
                                             <p:cond delay="0"/>
                                           </p:stCondLst>
@@ -36005,44 +35558,64 @@
                                         <p:strVal val="visible"/>
                                       </p:to>
                                     </p:set>
-                                    <p:animEffect transition="in" filter="barn(inVertical)">
-                                      <p:cBhvr>
-                                        <p:cTn id="30" dur="500"/>
+                                    <p:anim calcmode="lin" valueType="num">
+                                      <p:cBhvr additive="base">
+                                        <p:cTn id="56" dur="500" fill="hold"/>
                                         <p:tgtEl>
                                           <p:spTgt spid="15"/>
                                         </p:tgtEl>
+                                        <p:attrNameLst>
+                                          <p:attrName>ppt_x</p:attrName>
+                                        </p:attrNameLst>
                                       </p:cBhvr>
-                                    </p:animEffect>
+                                      <p:tavLst>
+                                        <p:tav tm="0">
+                                          <p:val>
+                                            <p:strVal val="#ppt_x"/>
+                                          </p:val>
+                                        </p:tav>
+                                        <p:tav tm="100000">
+                                          <p:val>
+                                            <p:strVal val="#ppt_x"/>
+                                          </p:val>
+                                        </p:tav>
+                                      </p:tavLst>
+                                    </p:anim>
+                                    <p:anim calcmode="lin" valueType="num">
+                                      <p:cBhvr additive="base">
+                                        <p:cTn id="57" dur="500" fill="hold"/>
+                                        <p:tgtEl>
+                                          <p:spTgt spid="15"/>
+                                        </p:tgtEl>
+                                        <p:attrNameLst>
+                                          <p:attrName>ppt_y</p:attrName>
+                                        </p:attrNameLst>
+                                      </p:cBhvr>
+                                      <p:tavLst>
+                                        <p:tav tm="0">
+                                          <p:val>
+                                            <p:strVal val="1+#ppt_h/2"/>
+                                          </p:val>
+                                        </p:tav>
+                                        <p:tav tm="100000">
+                                          <p:val>
+                                            <p:strVal val="#ppt_y"/>
+                                          </p:val>
+                                        </p:tav>
+                                      </p:tavLst>
+                                    </p:anim>
                                   </p:childTnLst>
                                 </p:cTn>
                               </p:par>
-                            </p:childTnLst>
-                          </p:cTn>
-                        </p:par>
-                      </p:childTnLst>
-                    </p:cTn>
-                  </p:par>
-                  <p:par>
-                    <p:cTn id="31" fill="hold">
-                      <p:stCondLst>
-                        <p:cond delay="indefinite"/>
-                      </p:stCondLst>
-                      <p:childTnLst>
-                        <p:par>
-                          <p:cTn id="32" fill="hold">
-                            <p:stCondLst>
-                              <p:cond delay="0"/>
-                            </p:stCondLst>
-                            <p:childTnLst>
                               <p:par>
-                                <p:cTn id="33" presetID="16" presetClass="entr" presetSubtype="21" fill="hold" grpId="0" nodeType="clickEffect">
+                                <p:cTn id="58" presetID="2" presetClass="entr" presetSubtype="4" fill="hold" grpId="0" nodeType="withEffect">
                                   <p:stCondLst>
                                     <p:cond delay="0"/>
                                   </p:stCondLst>
                                   <p:childTnLst>
                                     <p:set>
                                       <p:cBhvr>
-                                        <p:cTn id="34" dur="1" fill="hold">
+                                        <p:cTn id="59" dur="1" fill="hold">
                                           <p:stCondLst>
                                             <p:cond delay="0"/>
                                           </p:stCondLst>
@@ -36058,26 +35631,64 @@
                                         <p:strVal val="visible"/>
                                       </p:to>
                                     </p:set>
-                                    <p:animEffect transition="in" filter="barn(inVertical)">
-                                      <p:cBhvr>
-                                        <p:cTn id="35" dur="500"/>
+                                    <p:anim calcmode="lin" valueType="num">
+                                      <p:cBhvr additive="base">
+                                        <p:cTn id="60" dur="500" fill="hold"/>
                                         <p:tgtEl>
                                           <p:spTgt spid="16"/>
                                         </p:tgtEl>
+                                        <p:attrNameLst>
+                                          <p:attrName>ppt_x</p:attrName>
+                                        </p:attrNameLst>
                                       </p:cBhvr>
-                                    </p:animEffect>
+                                      <p:tavLst>
+                                        <p:tav tm="0">
+                                          <p:val>
+                                            <p:strVal val="#ppt_x"/>
+                                          </p:val>
+                                        </p:tav>
+                                        <p:tav tm="100000">
+                                          <p:val>
+                                            <p:strVal val="#ppt_x"/>
+                                          </p:val>
+                                        </p:tav>
+                                      </p:tavLst>
+                                    </p:anim>
+                                    <p:anim calcmode="lin" valueType="num">
+                                      <p:cBhvr additive="base">
+                                        <p:cTn id="61" dur="500" fill="hold"/>
+                                        <p:tgtEl>
+                                          <p:spTgt spid="16"/>
+                                        </p:tgtEl>
+                                        <p:attrNameLst>
+                                          <p:attrName>ppt_y</p:attrName>
+                                        </p:attrNameLst>
+                                      </p:cBhvr>
+                                      <p:tavLst>
+                                        <p:tav tm="0">
+                                          <p:val>
+                                            <p:strVal val="1+#ppt_h/2"/>
+                                          </p:val>
+                                        </p:tav>
+                                        <p:tav tm="100000">
+                                          <p:val>
+                                            <p:strVal val="#ppt_y"/>
+                                          </p:val>
+                                        </p:tav>
+                                      </p:tavLst>
+                                    </p:anim>
                                   </p:childTnLst>
                                 </p:cTn>
                               </p:par>
                               <p:par>
-                                <p:cTn id="36" presetID="16" presetClass="entr" presetSubtype="21" fill="hold" grpId="0" nodeType="withEffect">
+                                <p:cTn id="62" presetID="2" presetClass="entr" presetSubtype="4" fill="hold" grpId="0" nodeType="withEffect">
                                   <p:stCondLst>
                                     <p:cond delay="0"/>
                                   </p:stCondLst>
                                   <p:childTnLst>
                                     <p:set>
                                       <p:cBhvr>
-                                        <p:cTn id="37" dur="1" fill="hold">
+                                        <p:cTn id="63" dur="1" fill="hold">
                                           <p:stCondLst>
                                             <p:cond delay="0"/>
                                           </p:stCondLst>
@@ -36093,14 +35704,52 @@
                                         <p:strVal val="visible"/>
                                       </p:to>
                                     </p:set>
-                                    <p:animEffect transition="in" filter="barn(inVertical)">
-                                      <p:cBhvr>
-                                        <p:cTn id="38" dur="500"/>
+                                    <p:anim calcmode="lin" valueType="num">
+                                      <p:cBhvr additive="base">
+                                        <p:cTn id="64" dur="500" fill="hold"/>
                                         <p:tgtEl>
                                           <p:spTgt spid="17"/>
                                         </p:tgtEl>
+                                        <p:attrNameLst>
+                                          <p:attrName>ppt_x</p:attrName>
+                                        </p:attrNameLst>
                                       </p:cBhvr>
-                                    </p:animEffect>
+                                      <p:tavLst>
+                                        <p:tav tm="0">
+                                          <p:val>
+                                            <p:strVal val="#ppt_x"/>
+                                          </p:val>
+                                        </p:tav>
+                                        <p:tav tm="100000">
+                                          <p:val>
+                                            <p:strVal val="#ppt_x"/>
+                                          </p:val>
+                                        </p:tav>
+                                      </p:tavLst>
+                                    </p:anim>
+                                    <p:anim calcmode="lin" valueType="num">
+                                      <p:cBhvr additive="base">
+                                        <p:cTn id="65" dur="500" fill="hold"/>
+                                        <p:tgtEl>
+                                          <p:spTgt spid="17"/>
+                                        </p:tgtEl>
+                                        <p:attrNameLst>
+                                          <p:attrName>ppt_y</p:attrName>
+                                        </p:attrNameLst>
+                                      </p:cBhvr>
+                                      <p:tavLst>
+                                        <p:tav tm="0">
+                                          <p:val>
+                                            <p:strVal val="1+#ppt_h/2"/>
+                                          </p:val>
+                                        </p:tav>
+                                        <p:tav tm="100000">
+                                          <p:val>
+                                            <p:strVal val="#ppt_y"/>
+                                          </p:val>
+                                        </p:tav>
+                                      </p:tavLst>
+                                    </p:anim>
                                   </p:childTnLst>
                                 </p:cTn>
                               </p:par>
@@ -36111,32 +35760,32 @@
                     </p:cTn>
                   </p:par>
                   <p:par>
-                    <p:cTn id="39" fill="hold">
+                    <p:cTn id="66" fill="hold">
                       <p:stCondLst>
                         <p:cond delay="indefinite"/>
                       </p:stCondLst>
                       <p:childTnLst>
                         <p:par>
-                          <p:cTn id="40" fill="hold">
+                          <p:cTn id="67" fill="hold">
                             <p:stCondLst>
                               <p:cond delay="0"/>
                             </p:stCondLst>
                             <p:childTnLst>
                               <p:par>
-                                <p:cTn id="41" presetID="16" presetClass="entr" presetSubtype="21" fill="hold" grpId="0" nodeType="clickEffect">
+                                <p:cTn id="68" presetID="2" presetClass="entr" presetSubtype="4" fill="hold" grpId="0" nodeType="clickEffect">
                                   <p:stCondLst>
                                     <p:cond delay="0"/>
                                   </p:stCondLst>
                                   <p:childTnLst>
                                     <p:set>
                                       <p:cBhvr>
-                                        <p:cTn id="42" dur="1" fill="hold">
+                                        <p:cTn id="69" dur="1" fill="hold">
                                           <p:stCondLst>
                                             <p:cond delay="0"/>
                                           </p:stCondLst>
                                         </p:cTn>
                                         <p:tgtEl>
-                                          <p:spTgt spid="18"/>
+                                          <p:spTgt spid="10"/>
                                         </p:tgtEl>
                                         <p:attrNameLst>
                                           <p:attrName>style.visibility</p:attrName>
@@ -36146,26 +35795,64 @@
                                         <p:strVal val="visible"/>
                                       </p:to>
                                     </p:set>
-                                    <p:animEffect transition="in" filter="barn(inVertical)">
-                                      <p:cBhvr>
-                                        <p:cTn id="43" dur="500"/>
+                                    <p:anim calcmode="lin" valueType="num">
+                                      <p:cBhvr additive="base">
+                                        <p:cTn id="70" dur="500" fill="hold"/>
                                         <p:tgtEl>
-                                          <p:spTgt spid="18"/>
+                                          <p:spTgt spid="10"/>
                                         </p:tgtEl>
+                                        <p:attrNameLst>
+                                          <p:attrName>ppt_x</p:attrName>
+                                        </p:attrNameLst>
                                       </p:cBhvr>
-                                    </p:animEffect>
+                                      <p:tavLst>
+                                        <p:tav tm="0">
+                                          <p:val>
+                                            <p:strVal val="#ppt_x"/>
+                                          </p:val>
+                                        </p:tav>
+                                        <p:tav tm="100000">
+                                          <p:val>
+                                            <p:strVal val="#ppt_x"/>
+                                          </p:val>
+                                        </p:tav>
+                                      </p:tavLst>
+                                    </p:anim>
+                                    <p:anim calcmode="lin" valueType="num">
+                                      <p:cBhvr additive="base">
+                                        <p:cTn id="71" dur="500" fill="hold"/>
+                                        <p:tgtEl>
+                                          <p:spTgt spid="10"/>
+                                        </p:tgtEl>
+                                        <p:attrNameLst>
+                                          <p:attrName>ppt_y</p:attrName>
+                                        </p:attrNameLst>
+                                      </p:cBhvr>
+                                      <p:tavLst>
+                                        <p:tav tm="0">
+                                          <p:val>
+                                            <p:strVal val="1+#ppt_h/2"/>
+                                          </p:val>
+                                        </p:tav>
+                                        <p:tav tm="100000">
+                                          <p:val>
+                                            <p:strVal val="#ppt_y"/>
+                                          </p:val>
+                                        </p:tav>
+                                      </p:tavLst>
+                                    </p:anim>
                                   </p:childTnLst>
                                 </p:cTn>
                               </p:par>
                               <p:par>
-                                <p:cTn id="44" presetID="16" presetClass="entr" presetSubtype="21" fill="hold" grpId="0" nodeType="withEffect">
+                                <p:cTn id="72" presetID="2" presetClass="entr" presetSubtype="4" fill="hold" grpId="0" nodeType="withEffect">
                                   <p:stCondLst>
                                     <p:cond delay="0"/>
                                   </p:stCondLst>
                                   <p:childTnLst>
                                     <p:set>
                                       <p:cBhvr>
-                                        <p:cTn id="45" dur="1" fill="hold">
+                                        <p:cTn id="73" dur="1" fill="hold">
                                           <p:stCondLst>
                                             <p:cond delay="0"/>
                                           </p:stCondLst>
@@ -36181,14 +35868,52 @@
                                         <p:strVal val="visible"/>
                                       </p:to>
                                     </p:set>
-                                    <p:animEffect transition="in" filter="barn(inVertical)">
-                                      <p:cBhvr>
-                                        <p:cTn id="46" dur="500"/>
+                                    <p:anim calcmode="lin" valueType="num">
+                                      <p:cBhvr additive="base">
+                                        <p:cTn id="74" dur="500" fill="hold"/>
                                         <p:tgtEl>
                                           <p:spTgt spid="19"/>
                                         </p:tgtEl>
+                                        <p:attrNameLst>
+                                          <p:attrName>ppt_x</p:attrName>
+                                        </p:attrNameLst>
                                       </p:cBhvr>
-                                    </p:animEffect>
+                                      <p:tavLst>
+                                        <p:tav tm="0">
+                                          <p:val>
+                                            <p:strVal val="#ppt_x"/>
+                                          </p:val>
+                                        </p:tav>
+                                        <p:tav tm="100000">
+                                          <p:val>
+                                            <p:strVal val="#ppt_x"/>
+                                          </p:val>
+                                        </p:tav>
+                                      </p:tavLst>
+                                    </p:anim>
+                                    <p:anim calcmode="lin" valueType="num">
+                                      <p:cBhvr additive="base">
+                                        <p:cTn id="75" dur="500" fill="hold"/>
+                                        <p:tgtEl>
+                                          <p:spTgt spid="19"/>
+                                        </p:tgtEl>
+                                        <p:attrNameLst>
+                                          <p:attrName>ppt_y</p:attrName>
+                                        </p:attrNameLst>
+                                      </p:cBhvr>
+                                      <p:tavLst>
+                                        <p:tav tm="0">
+                                          <p:val>
+                                            <p:strVal val="1+#ppt_h/2"/>
+                                          </p:val>
+                                        </p:tav>
+                                        <p:tav tm="100000">
+                                          <p:val>
+                                            <p:strVal val="#ppt_y"/>
+                                          </p:val>
+                                        </p:tav>
+                                      </p:tavLst>
+                                    </p:anim>
                                   </p:childTnLst>
                                 </p:cTn>
                               </p:par>
@@ -36199,32 +35924,32 @@
                     </p:cTn>
                   </p:par>
                   <p:par>
-                    <p:cTn id="47" fill="hold">
+                    <p:cTn id="76" fill="hold">
                       <p:stCondLst>
                         <p:cond delay="indefinite"/>
                       </p:stCondLst>
                       <p:childTnLst>
                         <p:par>
-                          <p:cTn id="48" fill="hold">
+                          <p:cTn id="77" fill="hold">
                             <p:stCondLst>
                               <p:cond delay="0"/>
                             </p:stCondLst>
                             <p:childTnLst>
                               <p:par>
-                                <p:cTn id="49" presetID="22" presetClass="entr" presetSubtype="4" fill="hold" grpId="0" nodeType="clickEffect">
+                                <p:cTn id="78" presetID="2" presetClass="entr" presetSubtype="4" fill="hold" grpId="0" nodeType="clickEffect">
                                   <p:stCondLst>
                                     <p:cond delay="0"/>
                                   </p:stCondLst>
                                   <p:childTnLst>
                                     <p:set>
                                       <p:cBhvr>
-                                        <p:cTn id="50" dur="1" fill="hold">
+                                        <p:cTn id="79" dur="1" fill="hold">
                                           <p:stCondLst>
                                             <p:cond delay="0"/>
                                           </p:stCondLst>
                                         </p:cTn>
                                         <p:tgtEl>
-                                          <p:spTgt spid="32"/>
+                                          <p:spTgt spid="26"/>
                                         </p:tgtEl>
                                         <p:attrNameLst>
                                           <p:attrName>style.visibility</p:attrName>
@@ -36234,14 +35959,198 @@
                                         <p:strVal val="visible"/>
                                       </p:to>
                                     </p:set>
-                                    <p:animEffect transition="in" filter="wipe(down)">
+                                    <p:anim calcmode="lin" valueType="num">
+                                      <p:cBhvr additive="base">
+                                        <p:cTn id="80" dur="500" fill="hold"/>
+                                        <p:tgtEl>
+                                          <p:spTgt spid="26"/>
+                                        </p:tgtEl>
+                                        <p:attrNameLst>
+                                          <p:attrName>ppt_x</p:attrName>
+                                        </p:attrNameLst>
+                                      </p:cBhvr>
+                                      <p:tavLst>
+                                        <p:tav tm="0">
+                                          <p:val>
+                                            <p:strVal val="#ppt_x"/>
+                                          </p:val>
+                                        </p:tav>
+                                        <p:tav tm="100000">
+                                          <p:val>
+                                            <p:strVal val="#ppt_x"/>
+                                          </p:val>
+                                        </p:tav>
+                                      </p:tavLst>
+                                    </p:anim>
+                                    <p:anim calcmode="lin" valueType="num">
+                                      <p:cBhvr additive="base">
+                                        <p:cTn id="81" dur="500" fill="hold"/>
+                                        <p:tgtEl>
+                                          <p:spTgt spid="26"/>
+                                        </p:tgtEl>
+                                        <p:attrNameLst>
+                                          <p:attrName>ppt_y</p:attrName>
+                                        </p:attrNameLst>
+                                      </p:cBhvr>
+                                      <p:tavLst>
+                                        <p:tav tm="0">
+                                          <p:val>
+                                            <p:strVal val="1+#ppt_h/2"/>
+                                          </p:val>
+                                        </p:tav>
+                                        <p:tav tm="100000">
+                                          <p:val>
+                                            <p:strVal val="#ppt_y"/>
+                                          </p:val>
+                                        </p:tav>
+                                      </p:tavLst>
+                                    </p:anim>
+                                  </p:childTnLst>
+                                </p:cTn>
+                              </p:par>
+                              <p:par>
+                                <p:cTn id="82" presetID="2" presetClass="entr" presetSubtype="4" fill="hold" grpId="0" nodeType="withEffect">
+                                  <p:stCondLst>
+                                    <p:cond delay="0"/>
+                                  </p:stCondLst>
+                                  <p:childTnLst>
+                                    <p:set>
                                       <p:cBhvr>
-                                        <p:cTn id="51" dur="500"/>
+                                        <p:cTn id="83" dur="1" fill="hold">
+                                          <p:stCondLst>
+                                            <p:cond delay="0"/>
+                                          </p:stCondLst>
+                                        </p:cTn>
                                         <p:tgtEl>
-                                          <p:spTgt spid="32"/>
+                                          <p:spTgt spid="22"/>
                                         </p:tgtEl>
+                                        <p:attrNameLst>
+                                          <p:attrName>style.visibility</p:attrName>
+                                        </p:attrNameLst>
                                       </p:cBhvr>
-                                    </p:animEffect>
+                                      <p:to>
+                                        <p:strVal val="visible"/>
+                                      </p:to>
+                                    </p:set>
+                                    <p:anim calcmode="lin" valueType="num">
+                                      <p:cBhvr additive="base">
+                                        <p:cTn id="84" dur="500" fill="hold"/>
+                                        <p:tgtEl>
+                                          <p:spTgt spid="22"/>
+                                        </p:tgtEl>
+                                        <p:attrNameLst>
+                                          <p:attrName>ppt_x</p:attrName>
+                                        </p:attrNameLst>
+                                      </p:cBhvr>
+                                      <p:tavLst>
+                                        <p:tav tm="0">
+                                          <p:val>
+                                            <p:strVal val="#ppt_x"/>
+                                          </p:val>
+                                        </p:tav>
+                                        <p:tav tm="100000">
+                                          <p:val>
+                                            <p:strVal val="#ppt_x"/>
+                                          </p:val>
+                                        </p:tav>
+                                      </p:tavLst>
+                                    </p:anim>
+                                    <p:anim calcmode="lin" valueType="num">
+                                      <p:cBhvr additive="base">
+                                        <p:cTn id="85" dur="500" fill="hold"/>
+                                        <p:tgtEl>
+                                          <p:spTgt spid="22"/>
+                                        </p:tgtEl>
+                                        <p:attrNameLst>
+                                          <p:attrName>ppt_y</p:attrName>
+                                        </p:attrNameLst>
+                                      </p:cBhvr>
+                                      <p:tavLst>
+                                        <p:tav tm="0">
+                                          <p:val>
+                                            <p:strVal val="1+#ppt_h/2"/>
+                                          </p:val>
+                                        </p:tav>
+                                        <p:tav tm="100000">
+                                          <p:val>
+                                            <p:strVal val="#ppt_y"/>
+                                          </p:val>
+                                        </p:tav>
+                                      </p:tavLst>
+                                    </p:anim>
+                                  </p:childTnLst>
+                                </p:cTn>
+                              </p:par>
+                              <p:par>
+                                <p:cTn id="86" presetID="2" presetClass="entr" presetSubtype="4" fill="hold" grpId="0" nodeType="withEffect">
+                                  <p:stCondLst>
+                                    <p:cond delay="0"/>
+                                  </p:stCondLst>
+                                  <p:childTnLst>
+                                    <p:set>
+                                      <p:cBhvr>
+                                        <p:cTn id="87" dur="1" fill="hold">
+                                          <p:stCondLst>
+                                            <p:cond delay="0"/>
+                                          </p:stCondLst>
+                                        </p:cTn>
+                                        <p:tgtEl>
+                                          <p:spTgt spid="24"/>
+                                        </p:tgtEl>
+                                        <p:attrNameLst>
+                                          <p:attrName>style.visibility</p:attrName>
+                                        </p:attrNameLst>
+                                      </p:cBhvr>
+                                      <p:to>
+                                        <p:strVal val="visible"/>
+                                      </p:to>
+                                    </p:set>
+                                    <p:anim calcmode="lin" valueType="num">
+                                      <p:cBhvr additive="base">
+                                        <p:cTn id="88" dur="500" fill="hold"/>
+                                        <p:tgtEl>
+                                          <p:spTgt spid="24"/>
+                                        </p:tgtEl>
+                                        <p:attrNameLst>
+                                          <p:attrName>ppt_x</p:attrName>
+                                        </p:attrNameLst>
+                                      </p:cBhvr>
+                                      <p:tavLst>
+                                        <p:tav tm="0">
+                                          <p:val>
+                                            <p:strVal val="#ppt_x"/>
+                                          </p:val>
+                                        </p:tav>
+                                        <p:tav tm="100000">
+                                          <p:val>
+                                            <p:strVal val="#ppt_x"/>
+                                          </p:val>
+                                        </p:tav>
+                                      </p:tavLst>
+                                    </p:anim>
+                                    <p:anim calcmode="lin" valueType="num">
+                                      <p:cBhvr additive="base">
+                                        <p:cTn id="89" dur="500" fill="hold"/>
+                                        <p:tgtEl>
+                                          <p:spTgt spid="24"/>
+                                        </p:tgtEl>
+                                        <p:attrNameLst>
+                                          <p:attrName>ppt_y</p:attrName>
+                                        </p:attrNameLst>
+                                      </p:cBhvr>
+                                      <p:tavLst>
+                                        <p:tav tm="0">
+                                          <p:val>
+                                            <p:strVal val="1+#ppt_h/2"/>
+                                          </p:val>
+                                        </p:tav>
+                                        <p:tav tm="100000">
+                                          <p:val>
+                                            <p:strVal val="#ppt_y"/>
+                                          </p:val>
+                                        </p:tav>
+                                      </p:tavLst>
+                                    </p:anim>
                                   </p:childTnLst>
                                 </p:cTn>
                               </p:par>
@@ -36275,21 +36184,28 @@
     <p:bldLst>
       <p:bldP spid="2" grpId="0"/>
       <p:bldP spid="8" grpId="0" animBg="1"/>
-      <p:bldP spid="11" grpId="0" animBg="1"/>
-      <p:bldP spid="13" grpId="0" animBg="1"/>
       <p:bldP spid="14" grpId="0" animBg="1"/>
       <p:bldP spid="15" grpId="0" animBg="1"/>
       <p:bldP spid="16" grpId="0" animBg="1"/>
       <p:bldP spid="17" grpId="0" animBg="1"/>
-      <p:bldP spid="18" grpId="0" animBg="1"/>
       <p:bldP spid="19" grpId="0" animBg="1"/>
-      <p:bldP spid="32" grpId="0" animBg="1"/>
+      <p:bldP spid="4" grpId="0" animBg="1"/>
+      <p:bldP spid="5" grpId="0" animBg="1"/>
+      <p:bldP spid="6" grpId="0" animBg="1"/>
+      <p:bldP spid="7" grpId="0" animBg="1"/>
+      <p:bldP spid="9" grpId="0" animBg="1"/>
+      <p:bldP spid="10" grpId="0" animBg="1"/>
+      <p:bldP spid="20" grpId="0" animBg="1"/>
+      <p:bldP spid="21" grpId="0" animBg="1"/>
+      <p:bldP spid="22" grpId="0" animBg="1"/>
+      <p:bldP spid="24" grpId="0" animBg="1"/>
+      <p:bldP spid="26" grpId="0" animBg="1"/>
     </p:bldLst>
   </p:timing>
 </p:sld>
 </file>
 
-<file path=ppt/slides/slide9.xml><?xml version="1.0" encoding="utf-8"?>
+<file path=ppt/slides/slide7.xml><?xml version="1.0" encoding="utf-8"?>
 <p:sld xmlns:a="http://schemas.openxmlformats.org/drawingml/2006/main" xmlns:r="http://schemas.openxmlformats.org/officeDocument/2006/relationships" xmlns:p="http://schemas.openxmlformats.org/presentationml/2006/main">
   <p:cSld>
     <p:spTree>
@@ -36358,7 +36274,7 @@
             <a:fld id="{C263D6C4-4840-40CC-AC84-17E24B3B7BDE}" type="slidenum">
               <a:rPr lang="en-US" noProof="0" smtClean="0"/>
               <a:pPr/>
-              <a:t>9</a:t>
+              <a:t>7</a:t>
             </a:fld>
             <a:endParaRPr lang="en-US" noProof="0" dirty="0"/>
           </a:p>
@@ -36537,6 +36453,417 @@
     <p:extLst>
       <p:ext uri="{BB962C8B-B14F-4D97-AF65-F5344CB8AC3E}">
         <p14:creationId xmlns:p14="http://schemas.microsoft.com/office/powerpoint/2010/main" val="2692938437"/>
+      </p:ext>
+    </p:extLst>
+  </p:cSld>
+  <p:clrMapOvr>
+    <a:masterClrMapping/>
+  </p:clrMapOvr>
+</p:sld>
+</file>
+
+<file path=ppt/slides/slide8.xml><?xml version="1.0" encoding="utf-8"?>
+<p:sld xmlns:a="http://schemas.openxmlformats.org/drawingml/2006/main" xmlns:r="http://schemas.openxmlformats.org/officeDocument/2006/relationships" xmlns:p="http://schemas.openxmlformats.org/presentationml/2006/main">
+  <p:cSld>
+    <p:spTree>
+      <p:nvGrpSpPr>
+        <p:cNvPr id="1" name=""/>
+        <p:cNvGrpSpPr/>
+        <p:nvPr/>
+      </p:nvGrpSpPr>
+      <p:grpSpPr>
+        <a:xfrm>
+          <a:off x="0" y="0"/>
+          <a:ext cx="0" cy="0"/>
+          <a:chOff x="0" y="0"/>
+          <a:chExt cx="0" cy="0"/>
+        </a:xfrm>
+      </p:grpSpPr>
+      <p:sp>
+        <p:nvSpPr>
+          <p:cNvPr id="2" name="Title 1">
+            <a:extLst>
+              <a:ext uri="{FF2B5EF4-FFF2-40B4-BE49-F238E27FC236}">
+                <a16:creationId xmlns:a16="http://schemas.microsoft.com/office/drawing/2014/main" id="{4A2A83BE-8AC8-5D47-11A2-4398A871A917}"/>
+              </a:ext>
+            </a:extLst>
+          </p:cNvPr>
+          <p:cNvSpPr>
+            <a:spLocks noGrp="1"/>
+          </p:cNvSpPr>
+          <p:nvPr>
+            <p:ph type="title"/>
+          </p:nvPr>
+        </p:nvSpPr>
+        <p:spPr/>
+        <p:txBody>
+          <a:bodyPr/>
+          <a:lstStyle/>
+          <a:p>
+            <a:r>
+              <a:rPr lang="en-US" dirty="0"/>
+              <a:t>Linear programming</a:t>
+            </a:r>
+          </a:p>
+        </p:txBody>
+      </p:sp>
+      <p:sp>
+        <p:nvSpPr>
+          <p:cNvPr id="3" name="Slide Number Placeholder 2">
+            <a:extLst>
+              <a:ext uri="{FF2B5EF4-FFF2-40B4-BE49-F238E27FC236}">
+                <a16:creationId xmlns:a16="http://schemas.microsoft.com/office/drawing/2014/main" id="{7AF3300F-ACB9-1363-28F0-2C0A1FAF64F8}"/>
+              </a:ext>
+            </a:extLst>
+          </p:cNvPr>
+          <p:cNvSpPr>
+            <a:spLocks noGrp="1"/>
+          </p:cNvSpPr>
+          <p:nvPr>
+            <p:ph type="sldNum" sz="quarter" idx="12"/>
+          </p:nvPr>
+        </p:nvSpPr>
+        <p:spPr/>
+        <p:txBody>
+          <a:bodyPr/>
+          <a:lstStyle/>
+          <a:p>
+            <a:fld id="{C263D6C4-4840-40CC-AC84-17E24B3B7BDE}" type="slidenum">
+              <a:rPr lang="en-US" noProof="0" smtClean="0"/>
+              <a:pPr/>
+              <a:t>8</a:t>
+            </a:fld>
+            <a:endParaRPr lang="en-US" noProof="0" dirty="0"/>
+          </a:p>
+        </p:txBody>
+      </p:sp>
+      <p:graphicFrame>
+        <p:nvGraphicFramePr>
+          <p:cNvPr id="8" name="Diagram 7">
+            <a:extLst>
+              <a:ext uri="{FF2B5EF4-FFF2-40B4-BE49-F238E27FC236}">
+                <a16:creationId xmlns:a16="http://schemas.microsoft.com/office/drawing/2014/main" id="{3652220F-1141-7D11-9177-97D172CBEDBF}"/>
+              </a:ext>
+            </a:extLst>
+          </p:cNvPr>
+          <p:cNvGraphicFramePr/>
+          <p:nvPr>
+            <p:extLst>
+              <p:ext uri="{D42A27DB-BD31-4B8C-83A1-F6EECF244321}">
+                <p14:modId xmlns:p14="http://schemas.microsoft.com/office/powerpoint/2010/main" val="3631554503"/>
+              </p:ext>
+            </p:extLst>
+          </p:nvPr>
+        </p:nvGraphicFramePr>
+        <p:xfrm>
+          <a:off x="1826315" y="1667894"/>
+          <a:ext cx="8450470" cy="4057742"/>
+        </p:xfrm>
+        <a:graphic>
+          <a:graphicData uri="http://schemas.openxmlformats.org/drawingml/2006/diagram">
+            <dgm:relIds xmlns:dgm="http://schemas.openxmlformats.org/drawingml/2006/diagram" xmlns:r="http://schemas.openxmlformats.org/officeDocument/2006/relationships" r:dm="rId2" r:lo="rId3" r:qs="rId4" r:cs="rId5"/>
+          </a:graphicData>
+        </a:graphic>
+      </p:graphicFrame>
+    </p:spTree>
+    <p:extLst>
+      <p:ext uri="{BB962C8B-B14F-4D97-AF65-F5344CB8AC3E}">
+        <p14:creationId xmlns:p14="http://schemas.microsoft.com/office/powerpoint/2010/main" val="3232853897"/>
+      </p:ext>
+    </p:extLst>
+  </p:cSld>
+  <p:clrMapOvr>
+    <a:masterClrMapping/>
+  </p:clrMapOvr>
+</p:sld>
+</file>
+
+<file path=ppt/slides/slide9.xml><?xml version="1.0" encoding="utf-8"?>
+<p:sld xmlns:a="http://schemas.openxmlformats.org/drawingml/2006/main" xmlns:r="http://schemas.openxmlformats.org/officeDocument/2006/relationships" xmlns:p="http://schemas.openxmlformats.org/presentationml/2006/main">
+  <p:cSld>
+    <p:spTree>
+      <p:nvGrpSpPr>
+        <p:cNvPr id="1" name=""/>
+        <p:cNvGrpSpPr/>
+        <p:nvPr/>
+      </p:nvGrpSpPr>
+      <p:grpSpPr>
+        <a:xfrm>
+          <a:off x="0" y="0"/>
+          <a:ext cx="0" cy="0"/>
+          <a:chOff x="0" y="0"/>
+          <a:chExt cx="0" cy="0"/>
+        </a:xfrm>
+      </p:grpSpPr>
+      <p:sp>
+        <p:nvSpPr>
+          <p:cNvPr id="2" name="Title 1">
+            <a:extLst>
+              <a:ext uri="{FF2B5EF4-FFF2-40B4-BE49-F238E27FC236}">
+                <a16:creationId xmlns:a16="http://schemas.microsoft.com/office/drawing/2014/main" id="{0C4D216D-BB92-D39F-71EC-330C47E9D031}"/>
+              </a:ext>
+            </a:extLst>
+          </p:cNvPr>
+          <p:cNvSpPr>
+            <a:spLocks noGrp="1"/>
+          </p:cNvSpPr>
+          <p:nvPr>
+            <p:ph type="title"/>
+          </p:nvPr>
+        </p:nvSpPr>
+        <p:spPr/>
+        <p:txBody>
+          <a:bodyPr/>
+          <a:lstStyle/>
+          <a:p>
+            <a:r>
+              <a:rPr lang="en-US" dirty="0"/>
+              <a:t>Output</a:t>
+            </a:r>
+          </a:p>
+        </p:txBody>
+      </p:sp>
+      <p:sp>
+        <p:nvSpPr>
+          <p:cNvPr id="3" name="Slide Number Placeholder 2">
+            <a:extLst>
+              <a:ext uri="{FF2B5EF4-FFF2-40B4-BE49-F238E27FC236}">
+                <a16:creationId xmlns:a16="http://schemas.microsoft.com/office/drawing/2014/main" id="{68092661-66BC-1ED4-C7F8-1D00981BCD04}"/>
+              </a:ext>
+            </a:extLst>
+          </p:cNvPr>
+          <p:cNvSpPr>
+            <a:spLocks noGrp="1"/>
+          </p:cNvSpPr>
+          <p:nvPr>
+            <p:ph type="sldNum" sz="quarter" idx="12"/>
+          </p:nvPr>
+        </p:nvSpPr>
+        <p:spPr/>
+        <p:txBody>
+          <a:bodyPr/>
+          <a:lstStyle/>
+          <a:p>
+            <a:fld id="{C263D6C4-4840-40CC-AC84-17E24B3B7BDE}" type="slidenum">
+              <a:rPr lang="en-US" noProof="0" smtClean="0"/>
+              <a:pPr/>
+              <a:t>9</a:t>
+            </a:fld>
+            <a:endParaRPr lang="en-US" noProof="0" dirty="0"/>
+          </a:p>
+        </p:txBody>
+      </p:sp>
+      <p:pic>
+        <p:nvPicPr>
+          <p:cNvPr id="9" name="Picture 8">
+            <a:extLst>
+              <a:ext uri="{FF2B5EF4-FFF2-40B4-BE49-F238E27FC236}">
+                <a16:creationId xmlns:a16="http://schemas.microsoft.com/office/drawing/2014/main" id="{82EB5BEE-58FC-D149-E595-E7413C61699B}"/>
+              </a:ext>
+            </a:extLst>
+          </p:cNvPr>
+          <p:cNvPicPr>
+            <a:picLocks noChangeAspect="1"/>
+          </p:cNvPicPr>
+          <p:nvPr/>
+        </p:nvPicPr>
+        <p:blipFill>
+          <a:blip r:embed="rId2"/>
+          <a:stretch>
+            <a:fillRect/>
+          </a:stretch>
+        </p:blipFill>
+        <p:spPr>
+          <a:xfrm>
+            <a:off x="167802" y="2638263"/>
+            <a:ext cx="4368858" cy="4041937"/>
+          </a:xfrm>
+          <a:prstGeom prst="rect">
+            <a:avLst/>
+          </a:prstGeom>
+        </p:spPr>
+      </p:pic>
+      <p:pic>
+        <p:nvPicPr>
+          <p:cNvPr id="11" name="Picture 10">
+            <a:extLst>
+              <a:ext uri="{FF2B5EF4-FFF2-40B4-BE49-F238E27FC236}">
+                <a16:creationId xmlns:a16="http://schemas.microsoft.com/office/drawing/2014/main" id="{0D04D7DA-622B-79EA-D274-48918E031F8F}"/>
+              </a:ext>
+            </a:extLst>
+          </p:cNvPr>
+          <p:cNvPicPr>
+            <a:picLocks noChangeAspect="1"/>
+          </p:cNvPicPr>
+          <p:nvPr/>
+        </p:nvPicPr>
+        <p:blipFill>
+          <a:blip r:embed="rId3"/>
+          <a:stretch>
+            <a:fillRect/>
+          </a:stretch>
+        </p:blipFill>
+        <p:spPr>
+          <a:xfrm>
+            <a:off x="7655341" y="2485830"/>
+            <a:ext cx="4210022" cy="4194370"/>
+          </a:xfrm>
+          <a:prstGeom prst="rect">
+            <a:avLst/>
+          </a:prstGeom>
+        </p:spPr>
+      </p:pic>
+      <p:sp>
+        <p:nvSpPr>
+          <p:cNvPr id="12" name="Oval 11">
+            <a:extLst>
+              <a:ext uri="{FF2B5EF4-FFF2-40B4-BE49-F238E27FC236}">
+                <a16:creationId xmlns:a16="http://schemas.microsoft.com/office/drawing/2014/main" id="{1B6C53B6-D6FA-11E6-6877-7C393AAF64B4}"/>
+              </a:ext>
+            </a:extLst>
+          </p:cNvPr>
+          <p:cNvSpPr/>
+          <p:nvPr/>
+        </p:nvSpPr>
+        <p:spPr>
+          <a:xfrm>
+            <a:off x="4200939" y="1457739"/>
+            <a:ext cx="3454402" cy="861391"/>
+          </a:xfrm>
+          <a:prstGeom prst="ellipse">
+            <a:avLst/>
+          </a:prstGeom>
+        </p:spPr>
+        <p:style>
+          <a:lnRef idx="2">
+            <a:schemeClr val="accent1">
+              <a:shade val="50000"/>
+            </a:schemeClr>
+          </a:lnRef>
+          <a:fillRef idx="1">
+            <a:schemeClr val="accent1"/>
+          </a:fillRef>
+          <a:effectRef idx="0">
+            <a:schemeClr val="accent1"/>
+          </a:effectRef>
+          <a:fontRef idx="minor">
+            <a:schemeClr val="lt1"/>
+          </a:fontRef>
+        </p:style>
+        <p:txBody>
+          <a:bodyPr rtlCol="0" anchor="ctr"/>
+          <a:lstStyle/>
+          <a:p>
+            <a:pPr algn="ctr"/>
+            <a:r>
+              <a:rPr lang="en-US" dirty="0"/>
+              <a:t>Linear programming</a:t>
+            </a:r>
+          </a:p>
+        </p:txBody>
+      </p:sp>
+      <p:sp>
+        <p:nvSpPr>
+          <p:cNvPr id="13" name="Arrow: Left 12">
+            <a:extLst>
+              <a:ext uri="{FF2B5EF4-FFF2-40B4-BE49-F238E27FC236}">
+                <a16:creationId xmlns:a16="http://schemas.microsoft.com/office/drawing/2014/main" id="{14C0BC87-C3E3-29C8-63CE-76DAFDEA3804}"/>
+              </a:ext>
+            </a:extLst>
+          </p:cNvPr>
+          <p:cNvSpPr/>
+          <p:nvPr/>
+        </p:nvSpPr>
+        <p:spPr>
+          <a:xfrm>
+            <a:off x="4708084" y="3246782"/>
+            <a:ext cx="1895917" cy="841927"/>
+          </a:xfrm>
+          <a:prstGeom prst="leftArrow">
+            <a:avLst/>
+          </a:prstGeom>
+        </p:spPr>
+        <p:style>
+          <a:lnRef idx="2">
+            <a:schemeClr val="accent1">
+              <a:shade val="50000"/>
+            </a:schemeClr>
+          </a:lnRef>
+          <a:fillRef idx="1">
+            <a:schemeClr val="accent1"/>
+          </a:fillRef>
+          <a:effectRef idx="0">
+            <a:schemeClr val="accent1"/>
+          </a:effectRef>
+          <a:fontRef idx="minor">
+            <a:schemeClr val="lt1"/>
+          </a:fontRef>
+        </p:style>
+        <p:txBody>
+          <a:bodyPr rtlCol="0" anchor="ctr"/>
+          <a:lstStyle/>
+          <a:p>
+            <a:pPr algn="ctr"/>
+            <a:r>
+              <a:rPr lang="en-US" dirty="0"/>
+              <a:t>Max value</a:t>
+            </a:r>
+          </a:p>
+        </p:txBody>
+      </p:sp>
+      <p:sp>
+        <p:nvSpPr>
+          <p:cNvPr id="14" name="Arrow: Right 13">
+            <a:extLst>
+              <a:ext uri="{FF2B5EF4-FFF2-40B4-BE49-F238E27FC236}">
+                <a16:creationId xmlns:a16="http://schemas.microsoft.com/office/drawing/2014/main" id="{A6E8553E-63D4-C6A0-AA6F-ED930558F85C}"/>
+              </a:ext>
+            </a:extLst>
+          </p:cNvPr>
+          <p:cNvSpPr/>
+          <p:nvPr/>
+        </p:nvSpPr>
+        <p:spPr>
+          <a:xfrm>
+            <a:off x="5287617" y="5168348"/>
+            <a:ext cx="2067340" cy="861391"/>
+          </a:xfrm>
+          <a:prstGeom prst="rightArrow">
+            <a:avLst/>
+          </a:prstGeom>
+        </p:spPr>
+        <p:style>
+          <a:lnRef idx="2">
+            <a:schemeClr val="accent1">
+              <a:shade val="50000"/>
+            </a:schemeClr>
+          </a:lnRef>
+          <a:fillRef idx="1">
+            <a:schemeClr val="accent1"/>
+          </a:fillRef>
+          <a:effectRef idx="0">
+            <a:schemeClr val="accent1"/>
+          </a:effectRef>
+          <a:fontRef idx="minor">
+            <a:schemeClr val="lt1"/>
+          </a:fontRef>
+        </p:style>
+        <p:txBody>
+          <a:bodyPr rtlCol="0" anchor="ctr"/>
+          <a:lstStyle/>
+          <a:p>
+            <a:pPr algn="ctr"/>
+            <a:r>
+              <a:rPr lang="en-US" dirty="0"/>
+              <a:t>Min value</a:t>
+            </a:r>
+          </a:p>
+        </p:txBody>
+      </p:sp>
+    </p:spTree>
+    <p:extLst>
+      <p:ext uri="{BB962C8B-B14F-4D97-AF65-F5344CB8AC3E}">
+        <p14:creationId xmlns:p14="http://schemas.microsoft.com/office/powerpoint/2010/main" val="46995629"/>
       </p:ext>
     </p:extLst>
   </p:cSld>
@@ -37338,20 +37665,20 @@
 </file>
 
 <file path=customXml/item1.xml><?xml version="1.0" encoding="utf-8"?>
-<p:properties xmlns:p="http://schemas.microsoft.com/office/2006/metadata/properties" xmlns:xsi="http://www.w3.org/2001/XMLSchema-instance" xmlns:pc="http://schemas.microsoft.com/office/infopath/2007/PartnerControls">
-  <documentManagement>
-    <MediaServiceKeyPoints xmlns="71af3243-3dd4-4a8d-8c0d-dd76da1f02a5" xsi:nil="true"/>
-  </documentManagement>
-</p:properties>
-</file>
-
-<file path=customXml/item2.xml><?xml version="1.0" encoding="utf-8"?>
 <?mso-contentType ?>
 <FormTemplates xmlns="http://schemas.microsoft.com/sharepoint/v3/contenttype/forms">
   <Display>DocumentLibraryForm</Display>
   <Edit>DocumentLibraryForm</Edit>
   <New>DocumentLibraryForm</New>
 </FormTemplates>
+</file>
+
+<file path=customXml/item2.xml><?xml version="1.0" encoding="utf-8"?>
+<p:properties xmlns:p="http://schemas.microsoft.com/office/2006/metadata/properties" xmlns:xsi="http://www.w3.org/2001/XMLSchema-instance" xmlns:pc="http://schemas.microsoft.com/office/infopath/2007/PartnerControls">
+  <documentManagement>
+    <MediaServiceKeyPoints xmlns="71af3243-3dd4-4a8d-8c0d-dd76da1f02a5" xsi:nil="true"/>
+  </documentManagement>
+</p:properties>
 </file>
 
 <file path=customXml/item3.xml><?xml version="1.0" encoding="utf-8"?>
@@ -37566,19 +37893,19 @@
 </file>
 
 <file path=customXml/itemProps1.xml><?xml version="1.0" encoding="utf-8"?>
+<ds:datastoreItem xmlns:ds="http://schemas.openxmlformats.org/officeDocument/2006/customXml" ds:itemID="{5B26E0C9-B2AA-42E6-97B6-E1B7D9EAF129}">
+  <ds:schemaRefs>
+    <ds:schemaRef ds:uri="http://schemas.microsoft.com/sharepoint/v3/contenttype/forms"/>
+  </ds:schemaRefs>
+</ds:datastoreItem>
+</file>
+
+<file path=customXml/itemProps2.xml><?xml version="1.0" encoding="utf-8"?>
 <ds:datastoreItem xmlns:ds="http://schemas.openxmlformats.org/officeDocument/2006/customXml" ds:itemID="{F5757914-1161-4661-9696-421FD6935CDD}">
   <ds:schemaRefs>
     <ds:schemaRef ds:uri="http://schemas.microsoft.com/office/2006/metadata/properties"/>
     <ds:schemaRef ds:uri="http://schemas.microsoft.com/office/infopath/2007/PartnerControls"/>
     <ds:schemaRef ds:uri="71af3243-3dd4-4a8d-8c0d-dd76da1f02a5"/>
-  </ds:schemaRefs>
-</ds:datastoreItem>
-</file>
-
-<file path=customXml/itemProps2.xml><?xml version="1.0" encoding="utf-8"?>
-<ds:datastoreItem xmlns:ds="http://schemas.openxmlformats.org/officeDocument/2006/customXml" ds:itemID="{5B26E0C9-B2AA-42E6-97B6-E1B7D9EAF129}">
-  <ds:schemaRefs>
-    <ds:schemaRef ds:uri="http://schemas.microsoft.com/sharepoint/v3/contenttype/forms"/>
   </ds:schemaRefs>
 </ds:datastoreItem>
 </file>

</xml_diff>